<commit_message>
chanes to create table with open xml
</commit_message>
<xml_diff>
--- a/Templates/UpdateExistingTable6.pptx
+++ b/Templates/UpdateExistingTable6.pptx
@@ -1,6 +1,6 @@
 
 <file path=ppt/presentation.xml><?xml version="1.0" encoding="utf-8"?>
-<p:presentation xmlns:a="http://schemas.openxmlformats.org/drawingml/2006/main" xmlns:r="http://schemas.openxmlformats.org/officeDocument/2006/relationships" xmlns:p="http://schemas.openxmlformats.org/presentationml/2006/main" saveSubsetFonts="1">
+<p:presentation xmlns:a="http://schemas.openxmlformats.org/drawingml/2006/main" xmlns:r="http://schemas.openxmlformats.org/officeDocument/2006/relationships" xmlns:p="http://schemas.openxmlformats.org/presentationml/2006/main">
   <p:sldMasterIdLst>
     <p:sldMasterId id="2147483648" r:id="rId1"/>
   </p:sldMasterIdLst>
@@ -1050,6 +1050,7 @@
               <a:rPr lang="en-US" smtClean="0"/>
               <a:t>Click to edit Master text styles</a:t>
             </a:r>
+            <a:endParaRPr lang="en-US" smtClean="0"/>
           </a:p>
         </p:txBody>
       </p:sp>
@@ -1531,6 +1532,7 @@
               <a:rPr lang="en-US" smtClean="0"/>
               <a:t>Click to edit Master text styles</a:t>
             </a:r>
+            <a:endParaRPr lang="en-US" smtClean="0"/>
           </a:p>
         </p:txBody>
       </p:sp>
@@ -1685,6 +1687,7 @@
               <a:rPr lang="en-US" smtClean="0"/>
               <a:t>Click to edit Master text styles</a:t>
             </a:r>
+            <a:endParaRPr lang="en-US" smtClean="0"/>
           </a:p>
         </p:txBody>
       </p:sp>
@@ -2271,6 +2274,7 @@
               <a:rPr lang="en-US" smtClean="0"/>
               <a:t>Click to edit Master text styles</a:t>
             </a:r>
+            <a:endParaRPr lang="en-US" smtClean="0"/>
           </a:p>
         </p:txBody>
       </p:sp>
@@ -2525,6 +2529,7 @@
               <a:rPr lang="en-US" smtClean="0"/>
               <a:t>Click to edit Master text styles</a:t>
             </a:r>
+            <a:endParaRPr lang="en-US" smtClean="0"/>
           </a:p>
         </p:txBody>
       </p:sp>
@@ -2891,7 +2896,7 @@
         <a:spcBef>
           <a:spcPct val="20000"/>
         </a:spcBef>
-        <a:buFont typeface="Arial" pitchFamily="34" charset="0"/>
+        <a:buFont typeface="Arial" panose="020B0604020202020204" pitchFamily="34" charset="0"/>
         <a:buChar char="•"/>
         <a:defRPr sz="3200" kern="1200">
           <a:solidFill>
@@ -2906,7 +2911,7 @@
         <a:spcBef>
           <a:spcPct val="20000"/>
         </a:spcBef>
-        <a:buFont typeface="Arial" pitchFamily="34" charset="0"/>
+        <a:buFont typeface="Arial" panose="020B0604020202020204" pitchFamily="34" charset="0"/>
         <a:buChar char="–"/>
         <a:defRPr sz="2800" kern="1200">
           <a:solidFill>
@@ -2921,7 +2926,7 @@
         <a:spcBef>
           <a:spcPct val="20000"/>
         </a:spcBef>
-        <a:buFont typeface="Arial" pitchFamily="34" charset="0"/>
+        <a:buFont typeface="Arial" panose="020B0604020202020204" pitchFamily="34" charset="0"/>
         <a:buChar char="•"/>
         <a:defRPr sz="2400" kern="1200">
           <a:solidFill>
@@ -2936,7 +2941,7 @@
         <a:spcBef>
           <a:spcPct val="20000"/>
         </a:spcBef>
-        <a:buFont typeface="Arial" pitchFamily="34" charset="0"/>
+        <a:buFont typeface="Arial" panose="020B0604020202020204" pitchFamily="34" charset="0"/>
         <a:buChar char="–"/>
         <a:defRPr sz="2000" kern="1200">
           <a:solidFill>
@@ -2951,7 +2956,7 @@
         <a:spcBef>
           <a:spcPct val="20000"/>
         </a:spcBef>
-        <a:buFont typeface="Arial" pitchFamily="34" charset="0"/>
+        <a:buFont typeface="Arial" panose="020B0604020202020204" pitchFamily="34" charset="0"/>
         <a:buChar char="»"/>
         <a:defRPr sz="2000" kern="1200">
           <a:solidFill>
@@ -2966,7 +2971,7 @@
         <a:spcBef>
           <a:spcPct val="20000"/>
         </a:spcBef>
-        <a:buFont typeface="Arial" pitchFamily="34" charset="0"/>
+        <a:buFont typeface="Arial" panose="020B0604020202020204" pitchFamily="34" charset="0"/>
         <a:buChar char="•"/>
         <a:defRPr sz="2000" kern="1200">
           <a:solidFill>
@@ -2981,7 +2986,7 @@
         <a:spcBef>
           <a:spcPct val="20000"/>
         </a:spcBef>
-        <a:buFont typeface="Arial" pitchFamily="34" charset="0"/>
+        <a:buFont typeface="Arial" panose="020B0604020202020204" pitchFamily="34" charset="0"/>
         <a:buChar char="•"/>
         <a:defRPr sz="2000" kern="1200">
           <a:solidFill>
@@ -2996,7 +3001,7 @@
         <a:spcBef>
           <a:spcPct val="20000"/>
         </a:spcBef>
-        <a:buFont typeface="Arial" pitchFamily="34" charset="0"/>
+        <a:buFont typeface="Arial" panose="020B0604020202020204" pitchFamily="34" charset="0"/>
         <a:buChar char="•"/>
         <a:defRPr sz="2000" kern="1200">
           <a:solidFill>
@@ -3011,7 +3016,7 @@
         <a:spcBef>
           <a:spcPct val="20000"/>
         </a:spcBef>
-        <a:buFont typeface="Arial" pitchFamily="34" charset="0"/>
+        <a:buFont typeface="Arial" panose="020B0604020202020204" pitchFamily="34" charset="0"/>
         <a:buChar char="•"/>
         <a:defRPr sz="2000" kern="1200">
           <a:solidFill>
@@ -3147,15 +3152,45 @@
           <a:chExt cx="0" cy="0"/>
         </a:xfrm>
       </p:grpSpPr>
+      <p:sp>
+        <p:nvSpPr>
+          <p:cNvPr id="2" name="Text Box 1"/>
+          <p:cNvSpPr txBox="1"/>
+          <p:nvPr/>
+        </p:nvSpPr>
+        <p:spPr>
+          <a:xfrm>
+            <a:off x="36830" y="93345"/>
+            <a:ext cx="9091295" cy="368300"/>
+          </a:xfrm>
+          <a:prstGeom prst="rect">
+            <a:avLst/>
+          </a:prstGeom>
+          <a:noFill/>
+        </p:spPr>
+        <p:txBody>
+          <a:bodyPr wrap="square" rtlCol="0">
+            <a:spAutoFit/>
+          </a:bodyPr>
+          <a:p>
+            <a:pPr algn="ctr"/>
+            <a:r>
+              <a:rPr lang="en-GB" altLang="en-US"/>
+              <a:t>Title</a:t>
+            </a:r>
+            <a:endParaRPr lang="en-GB" altLang="en-US"/>
+          </a:p>
+        </p:txBody>
+      </p:sp>
       <p:graphicFrame>
         <p:nvGraphicFramePr>
-          <p:cNvPr id="5" name="Table 4"/>
+          <p:cNvPr id="3" name="Table 2"/>
           <p:cNvGraphicFramePr/>
           <p:nvPr/>
         </p:nvGraphicFramePr>
         <p:xfrm>
-          <a:off x="395605" y="549275"/>
-          <a:ext cx="1191895" cy="753745"/>
+          <a:off x="1371600" y="2667000"/>
+          <a:ext cx="6400165" cy="2636520"/>
         </p:xfrm>
         <a:graphic>
           <a:graphicData uri="http://schemas.openxmlformats.org/drawingml/2006/table">
@@ -3164,9 +3199,10 @@
                 <a:tableStyleId>{5C22544A-7EE6-4342-B048-85BDC9FD1C3A}</a:tableStyleId>
               </a:tblPr>
               <a:tblGrid>
-                <a:gridCol w="1191895"/>
+                <a:gridCol w="3199765"/>
+                <a:gridCol w="3199765"/>
               </a:tblGrid>
-              <a:tr h="372745">
+              <a:tr h="381000">
                 <a:tc>
                   <a:txBody>
                     <a:bodyPr/>
@@ -3174,18 +3210,22 @@
                       <a:pPr>
                         <a:buNone/>
                       </a:pPr>
-                      <a:endParaRPr lang="en-GB" sz="1200">
-                        <a:solidFill>
-                          <a:schemeClr val="bg1"/>
-                        </a:solidFill>
-                      </a:endParaRPr>
+                      <a:endParaRPr lang="en-US"/>
                     </a:p>
                   </a:txBody>
-                  <a:tcPr>
-                    <a:solidFill>
-                      <a:srgbClr val="666666"/>
-                    </a:solidFill>
-                  </a:tcPr>
+                  <a:tcPr/>
+                </a:tc>
+                <a:tc>
+                  <a:txBody>
+                    <a:bodyPr/>
+                    <a:p>
+                      <a:pPr>
+                        <a:buNone/>
+                      </a:pPr>
+                      <a:endParaRPr lang="en-US"/>
+                    </a:p>
+                  </a:txBody>
+                  <a:tcPr/>
                 </a:tc>
               </a:tr>
               <a:tr h="381000">
@@ -3196,56 +3236,158 @@
                       <a:pPr>
                         <a:buNone/>
                       </a:pPr>
-                      <a:endParaRPr lang="en-GB" sz="1200" b="0">
-                        <a:solidFill>
-                          <a:schemeClr val="bg1"/>
-                        </a:solidFill>
-                      </a:endParaRPr>
+                      <a:endParaRPr lang="en-US"/>
                     </a:p>
                   </a:txBody>
-                  <a:tcPr>
-                    <a:solidFill>
-                      <a:schemeClr val="bg1">
-                        <a:lumMod val="50000"/>
-                      </a:schemeClr>
-                    </a:solidFill>
-                  </a:tcPr>
+                  <a:tcPr/>
+                </a:tc>
+                <a:tc>
+                  <a:txBody>
+                    <a:bodyPr/>
+                    <a:p>
+                      <a:pPr>
+                        <a:buNone/>
+                      </a:pPr>
+                      <a:endParaRPr lang="en-US" dirty="0"/>
+                    </a:p>
+                  </a:txBody>
+                  <a:tcPr/>
+                </a:tc>
+              </a:tr>
+              <a:tr h="381000">
+                <a:tc>
+                  <a:txBody>
+                    <a:bodyPr/>
+                    <a:p>
+                      <a:pPr>
+                        <a:buNone/>
+                      </a:pPr>
+                      <a:endParaRPr lang="en-US"/>
+                    </a:p>
+                  </a:txBody>
+                  <a:tcPr/>
+                </a:tc>
+                <a:tc>
+                  <a:txBody>
+                    <a:bodyPr/>
+                    <a:p>
+                      <a:pPr>
+                        <a:buNone/>
+                      </a:pPr>
+                      <a:endParaRPr lang="en-US"/>
+                    </a:p>
+                  </a:txBody>
+                  <a:tcPr/>
+                </a:tc>
+              </a:tr>
+              <a:tr h="381000">
+                <a:tc>
+                  <a:txBody>
+                    <a:bodyPr/>
+                    <a:p>
+                      <a:pPr>
+                        <a:buNone/>
+                      </a:pPr>
+                      <a:endParaRPr lang="en-US"/>
+                    </a:p>
+                  </a:txBody>
+                  <a:tcPr/>
+                </a:tc>
+                <a:tc>
+                  <a:txBody>
+                    <a:bodyPr/>
+                    <a:p>
+                      <a:pPr>
+                        <a:buNone/>
+                      </a:pPr>
+                      <a:endParaRPr lang="en-US"/>
+                    </a:p>
+                  </a:txBody>
+                  <a:tcPr/>
+                </a:tc>
+              </a:tr>
+              <a:tr h="370840">
+                <a:tc>
+                  <a:txBody>
+                    <a:bodyPr/>
+                    <a:p>
+                      <a:pPr>
+                        <a:buNone/>
+                      </a:pPr>
+                      <a:endParaRPr lang="en-US"/>
+                    </a:p>
+                  </a:txBody>
+                  <a:tcPr/>
+                </a:tc>
+                <a:tc>
+                  <a:txBody>
+                    <a:bodyPr/>
+                    <a:p>
+                      <a:pPr>
+                        <a:buNone/>
+                      </a:pPr>
+                      <a:endParaRPr lang="en-US"/>
+                    </a:p>
+                  </a:txBody>
+                  <a:tcPr/>
+                </a:tc>
+              </a:tr>
+              <a:tr h="370840">
+                <a:tc>
+                  <a:txBody>
+                    <a:bodyPr/>
+                    <a:p>
+                      <a:pPr>
+                        <a:buNone/>
+                      </a:pPr>
+                      <a:endParaRPr lang="en-US"/>
+                    </a:p>
+                  </a:txBody>
+                  <a:tcPr/>
+                </a:tc>
+                <a:tc>
+                  <a:txBody>
+                    <a:bodyPr/>
+                    <a:p>
+                      <a:pPr>
+                        <a:buNone/>
+                      </a:pPr>
+                      <a:endParaRPr lang="en-US"/>
+                    </a:p>
+                  </a:txBody>
+                  <a:tcPr/>
+                </a:tc>
+              </a:tr>
+              <a:tr h="370840">
+                <a:tc>
+                  <a:txBody>
+                    <a:bodyPr/>
+                    <a:p>
+                      <a:pPr>
+                        <a:buNone/>
+                      </a:pPr>
+                      <a:endParaRPr lang="en-US"/>
+                    </a:p>
+                  </a:txBody>
+                  <a:tcPr/>
+                </a:tc>
+                <a:tc>
+                  <a:txBody>
+                    <a:bodyPr/>
+                    <a:p>
+                      <a:pPr>
+                        <a:buNone/>
+                      </a:pPr>
+                      <a:endParaRPr lang="en-US"/>
+                    </a:p>
+                  </a:txBody>
+                  <a:tcPr/>
                 </a:tc>
               </a:tr>
             </a:tbl>
           </a:graphicData>
         </a:graphic>
       </p:graphicFrame>
-      <p:sp>
-        <p:nvSpPr>
-          <p:cNvPr id="2" name="Text Box 1"/>
-          <p:cNvSpPr txBox="1"/>
-          <p:nvPr/>
-        </p:nvSpPr>
-        <p:spPr>
-          <a:xfrm>
-            <a:off x="36830" y="93345"/>
-            <a:ext cx="9091295" cy="368300"/>
-          </a:xfrm>
-          <a:prstGeom prst="rect">
-            <a:avLst/>
-          </a:prstGeom>
-          <a:noFill/>
-        </p:spPr>
-        <p:txBody>
-          <a:bodyPr wrap="square" rtlCol="0">
-            <a:spAutoFit/>
-          </a:bodyPr>
-          <a:p>
-            <a:pPr algn="ctr"/>
-            <a:r>
-              <a:rPr lang="en-GB" altLang="en-US"/>
-              <a:t>Title</a:t>
-            </a:r>
-            <a:endParaRPr lang="en-GB" altLang="en-US"/>
-          </a:p>
-        </p:txBody>
-      </p:sp>
     </p:spTree>
   </p:cSld>
   <p:clrMapOvr>
@@ -3542,8 +3684,6 @@
       </a:bgFillStyleLst>
     </a:fmtScheme>
   </a:themeElements>
-  <a:objectDefaults/>
-  <a:extraClrSchemeLst/>
   <a:extLst>
     <a:ext uri="{05A4C25C-085E-4340-85A3-A5531E510DB2}">
       <thm15:themeFamily xmlns:thm15="http://schemas.microsoft.com/office/thememl/2012/main" name="Office Theme" id="{62F939B6-93AF-4DB8-9C6B-D6C7DFDC589F}" vid="{4A3C46E8-61CC-4603-A589-7422A47A8E4A}"/>

</xml_diff>

<commit_message>
created table with spire
</commit_message>
<xml_diff>
--- a/Templates/UpdateExistingTable6.pptx
+++ b/Templates/UpdateExistingTable6.pptx
@@ -1,14 +1,18 @@
 
 <file path=ppt/presentation.xml><?xml version="1.0" encoding="utf-8"?>
-<p:presentation xmlns:a="http://schemas.openxmlformats.org/drawingml/2006/main" xmlns:r="http://schemas.openxmlformats.org/officeDocument/2006/relationships" xmlns:p="http://schemas.openxmlformats.org/presentationml/2006/main">
+<!--Generated by Spire.Presentation for .NET 4.1.21.10320-->
+<p:presentation xmlns:a="http://schemas.openxmlformats.org/drawingml/2006/main" xmlns:r="http://schemas.openxmlformats.org/officeDocument/2006/relationships" xmlns:p="http://schemas.openxmlformats.org/presentationml/2006/main" saveSubsetFonts="1">
   <p:sldMasterIdLst>
-    <p:sldMasterId id="2147483648" r:id="rId1"/>
+    <p:sldMasterId r:id="rId1" id="2147483648"/>
   </p:sldMasterIdLst>
   <p:sldIdLst>
-    <p:sldId id="256" r:id="rId3"/>
+    <p:sldId r:id="rId2" id="256"/>
   </p:sldIdLst>
   <p:sldSz cx="9144000" cy="6858000" type="screen4x3"/>
   <p:notesSz cx="6858000" cy="9144000"/>
+  <p:custDataLst>
+    <p:tags r:id="rId7"/>
+  </p:custDataLst>
   <p:defaultTextStyle>
     <a:defPPr>
       <a:defRPr lang="en-US"/>
@@ -127,9 +131,7 @@
       <p:sp>
         <p:nvSpPr>
           <p:cNvPr id="2" name="Title 1"/>
-          <p:cNvSpPr>
-            <a:spLocks noGrp="1"/>
-          </p:cNvSpPr>
+          <p:cNvSpPr/>
           <p:nvPr>
             <p:ph type="ctrTitle"/>
           </p:nvPr>
@@ -145,7 +147,7 @@
           <a:lstStyle/>
           <a:p>
             <a:r>
-              <a:rPr lang="en-US" smtClean="0"/>
+              <a:rPr lang="en-US" dirty="1" smtClean="0"/>
               <a:t>Click to edit Master title style</a:t>
             </a:r>
             <a:endParaRPr lang="en-US"/>
@@ -155,9 +157,7 @@
       <p:sp>
         <p:nvSpPr>
           <p:cNvPr id="3" name="Subtitle 2"/>
-          <p:cNvSpPr>
-            <a:spLocks noGrp="1"/>
-          </p:cNvSpPr>
+          <p:cNvSpPr/>
           <p:nvPr>
             <p:ph type="subTitle" idx="1"/>
           </p:nvPr>
@@ -264,7 +264,7 @@
           </a:lstStyle>
           <a:p>
             <a:r>
-              <a:rPr lang="en-US" smtClean="0"/>
+              <a:rPr lang="en-US" dirty="1" smtClean="0"/>
               <a:t>Click to edit Master subtitle style</a:t>
             </a:r>
             <a:endParaRPr lang="en-US"/>
@@ -274,9 +274,7 @@
       <p:sp>
         <p:nvSpPr>
           <p:cNvPr id="4" name="Date Placeholder 3"/>
-          <p:cNvSpPr>
-            <a:spLocks noGrp="1"/>
-          </p:cNvSpPr>
+          <p:cNvSpPr/>
           <p:nvPr>
             <p:ph type="dt" sz="half" idx="10"/>
           </p:nvPr>
@@ -288,6 +286,7 @@
           <a:p>
             <a:fld id="{E8FD0B7A-F5DD-4F40-B4CB-3B2C354B893A}" type="datetimeFigureOut">
               <a:rPr lang="en-US" smtClean="0"/>
+              <a:t>3/4/2014</a:t>
             </a:fld>
             <a:endParaRPr lang="en-US"/>
           </a:p>
@@ -296,9 +295,7 @@
       <p:sp>
         <p:nvSpPr>
           <p:cNvPr id="5" name="Footer Placeholder 4"/>
-          <p:cNvSpPr>
-            <a:spLocks noGrp="1"/>
-          </p:cNvSpPr>
+          <p:cNvSpPr/>
           <p:nvPr>
             <p:ph type="ftr" sz="quarter" idx="11"/>
           </p:nvPr>
@@ -315,9 +312,7 @@
       <p:sp>
         <p:nvSpPr>
           <p:cNvPr id="6" name="Slide Number Placeholder 5"/>
-          <p:cNvSpPr>
-            <a:spLocks noGrp="1"/>
-          </p:cNvSpPr>
+          <p:cNvSpPr/>
           <p:nvPr>
             <p:ph type="sldNum" sz="quarter" idx="12"/>
           </p:nvPr>
@@ -329,6 +324,7 @@
           <a:p>
             <a:fld id="{93AE1883-0942-4AA3-9DB2-9C7C3A0314B1}" type="slidenum">
               <a:rPr lang="en-US" smtClean="0"/>
+              <a:t>‹#›</a:t>
             </a:fld>
             <a:endParaRPr lang="en-US"/>
           </a:p>
@@ -339,11 +335,11 @@
   <p:clrMapOvr>
     <a:masterClrMapping/>
   </p:clrMapOvr>
-  <p:transition/>
+  <p:transition spd="fast"/>
   <p:timing>
     <p:tnLst>
       <p:par>
-        <p:cTn id="1" dur="indefinite" restart="never" nodeType="tmRoot"/>
+        <p:cTn id="1" restart="never" nodeType="tmRoot"/>
       </p:par>
     </p:tnLst>
   </p:timing>
@@ -370,9 +366,7 @@
       <p:sp>
         <p:nvSpPr>
           <p:cNvPr id="2" name="Title 1"/>
-          <p:cNvSpPr>
-            <a:spLocks noGrp="1"/>
-          </p:cNvSpPr>
+          <p:cNvSpPr/>
           <p:nvPr>
             <p:ph type="title"/>
           </p:nvPr>
@@ -383,7 +377,7 @@
           <a:lstStyle/>
           <a:p>
             <a:r>
-              <a:rPr lang="en-US" smtClean="0"/>
+              <a:rPr lang="en-US" dirty="1" smtClean="0"/>
               <a:t>Click to edit Master title style</a:t>
             </a:r>
             <a:endParaRPr lang="en-US"/>
@@ -393,9 +387,7 @@
       <p:sp>
         <p:nvSpPr>
           <p:cNvPr id="3" name="Vertical Text Placeholder 2"/>
-          <p:cNvSpPr>
-            <a:spLocks noGrp="1"/>
-          </p:cNvSpPr>
+          <p:cNvSpPr/>
           <p:nvPr>
             <p:ph type="body" orient="vert" idx="1"/>
           </p:nvPr>
@@ -407,39 +399,35 @@
           <a:p>
             <a:pPr lvl="0"/>
             <a:r>
-              <a:rPr lang="en-US" smtClean="0"/>
+              <a:rPr lang="en-US" dirty="1" smtClean="0"/>
               <a:t>Click to edit Master text styles</a:t>
             </a:r>
-            <a:endParaRPr lang="en-US" smtClean="0"/>
           </a:p>
           <a:p>
             <a:pPr lvl="1"/>
             <a:r>
-              <a:rPr lang="en-US" smtClean="0"/>
+              <a:rPr lang="en-US" dirty="1" smtClean="0"/>
               <a:t>Second level</a:t>
             </a:r>
-            <a:endParaRPr lang="en-US" smtClean="0"/>
           </a:p>
           <a:p>
             <a:pPr lvl="2"/>
             <a:r>
-              <a:rPr lang="en-US" smtClean="0"/>
+              <a:rPr lang="en-US" dirty="1" smtClean="0"/>
               <a:t>Third level</a:t>
             </a:r>
-            <a:endParaRPr lang="en-US" smtClean="0"/>
           </a:p>
           <a:p>
             <a:pPr lvl="3"/>
             <a:r>
-              <a:rPr lang="en-US" smtClean="0"/>
+              <a:rPr lang="en-US" dirty="1" smtClean="0"/>
               <a:t>Fourth level</a:t>
             </a:r>
-            <a:endParaRPr lang="en-US" smtClean="0"/>
           </a:p>
           <a:p>
             <a:pPr lvl="4"/>
             <a:r>
-              <a:rPr lang="en-US" smtClean="0"/>
+              <a:rPr lang="en-US" dirty="1" smtClean="0"/>
               <a:t>Fifth level</a:t>
             </a:r>
             <a:endParaRPr lang="en-US"/>
@@ -449,9 +437,7 @@
       <p:sp>
         <p:nvSpPr>
           <p:cNvPr id="4" name="Date Placeholder 3"/>
-          <p:cNvSpPr>
-            <a:spLocks noGrp="1"/>
-          </p:cNvSpPr>
+          <p:cNvSpPr/>
           <p:nvPr>
             <p:ph type="dt" sz="half" idx="10"/>
           </p:nvPr>
@@ -463,6 +449,7 @@
           <a:p>
             <a:fld id="{E8FD0B7A-F5DD-4F40-B4CB-3B2C354B893A}" type="datetimeFigureOut">
               <a:rPr lang="en-US" smtClean="0"/>
+              <a:t>3/4/2014</a:t>
             </a:fld>
             <a:endParaRPr lang="en-US"/>
           </a:p>
@@ -471,9 +458,7 @@
       <p:sp>
         <p:nvSpPr>
           <p:cNvPr id="5" name="Footer Placeholder 4"/>
-          <p:cNvSpPr>
-            <a:spLocks noGrp="1"/>
-          </p:cNvSpPr>
+          <p:cNvSpPr/>
           <p:nvPr>
             <p:ph type="ftr" sz="quarter" idx="11"/>
           </p:nvPr>
@@ -490,9 +475,7 @@
       <p:sp>
         <p:nvSpPr>
           <p:cNvPr id="6" name="Slide Number Placeholder 5"/>
-          <p:cNvSpPr>
-            <a:spLocks noGrp="1"/>
-          </p:cNvSpPr>
+          <p:cNvSpPr/>
           <p:nvPr>
             <p:ph type="sldNum" sz="quarter" idx="12"/>
           </p:nvPr>
@@ -504,6 +487,7 @@
           <a:p>
             <a:fld id="{93AE1883-0942-4AA3-9DB2-9C7C3A0314B1}" type="slidenum">
               <a:rPr lang="en-US" smtClean="0"/>
+              <a:t>‹#›</a:t>
             </a:fld>
             <a:endParaRPr lang="en-US"/>
           </a:p>
@@ -514,11 +498,11 @@
   <p:clrMapOvr>
     <a:masterClrMapping/>
   </p:clrMapOvr>
-  <p:transition/>
+  <p:transition spd="fast"/>
   <p:timing>
     <p:tnLst>
       <p:par>
-        <p:cTn id="1" dur="indefinite" restart="never" nodeType="tmRoot"/>
+        <p:cTn id="1" restart="never" nodeType="tmRoot"/>
       </p:par>
     </p:tnLst>
   </p:timing>
@@ -545,9 +529,7 @@
       <p:sp>
         <p:nvSpPr>
           <p:cNvPr id="2" name="Vertical Title 1"/>
-          <p:cNvSpPr>
-            <a:spLocks noGrp="1"/>
-          </p:cNvSpPr>
+          <p:cNvSpPr/>
           <p:nvPr>
             <p:ph type="title" orient="vert"/>
           </p:nvPr>
@@ -563,7 +545,7 @@
           <a:lstStyle/>
           <a:p>
             <a:r>
-              <a:rPr lang="en-US" smtClean="0"/>
+              <a:rPr lang="en-US" dirty="1" smtClean="0"/>
               <a:t>Click to edit Master title style</a:t>
             </a:r>
             <a:endParaRPr lang="en-US"/>
@@ -573,9 +555,7 @@
       <p:sp>
         <p:nvSpPr>
           <p:cNvPr id="3" name="Vertical Text Placeholder 2"/>
-          <p:cNvSpPr>
-            <a:spLocks noGrp="1"/>
-          </p:cNvSpPr>
+          <p:cNvSpPr/>
           <p:nvPr>
             <p:ph type="body" orient="vert" idx="1"/>
           </p:nvPr>
@@ -592,39 +572,35 @@
           <a:p>
             <a:pPr lvl="0"/>
             <a:r>
-              <a:rPr lang="en-US" smtClean="0"/>
+              <a:rPr lang="en-US" dirty="1" smtClean="0"/>
               <a:t>Click to edit Master text styles</a:t>
             </a:r>
-            <a:endParaRPr lang="en-US" smtClean="0"/>
           </a:p>
           <a:p>
             <a:pPr lvl="1"/>
             <a:r>
-              <a:rPr lang="en-US" smtClean="0"/>
+              <a:rPr lang="en-US" dirty="1" smtClean="0"/>
               <a:t>Second level</a:t>
             </a:r>
-            <a:endParaRPr lang="en-US" smtClean="0"/>
           </a:p>
           <a:p>
             <a:pPr lvl="2"/>
             <a:r>
-              <a:rPr lang="en-US" smtClean="0"/>
+              <a:rPr lang="en-US" dirty="1" smtClean="0"/>
               <a:t>Third level</a:t>
             </a:r>
-            <a:endParaRPr lang="en-US" smtClean="0"/>
           </a:p>
           <a:p>
             <a:pPr lvl="3"/>
             <a:r>
-              <a:rPr lang="en-US" smtClean="0"/>
+              <a:rPr lang="en-US" dirty="1" smtClean="0"/>
               <a:t>Fourth level</a:t>
             </a:r>
-            <a:endParaRPr lang="en-US" smtClean="0"/>
           </a:p>
           <a:p>
             <a:pPr lvl="4"/>
             <a:r>
-              <a:rPr lang="en-US" smtClean="0"/>
+              <a:rPr lang="en-US" dirty="1" smtClean="0"/>
               <a:t>Fifth level</a:t>
             </a:r>
             <a:endParaRPr lang="en-US"/>
@@ -634,9 +610,7 @@
       <p:sp>
         <p:nvSpPr>
           <p:cNvPr id="4" name="Date Placeholder 3"/>
-          <p:cNvSpPr>
-            <a:spLocks noGrp="1"/>
-          </p:cNvSpPr>
+          <p:cNvSpPr/>
           <p:nvPr>
             <p:ph type="dt" sz="half" idx="10"/>
           </p:nvPr>
@@ -648,6 +622,7 @@
           <a:p>
             <a:fld id="{E8FD0B7A-F5DD-4F40-B4CB-3B2C354B893A}" type="datetimeFigureOut">
               <a:rPr lang="en-US" smtClean="0"/>
+              <a:t>3/4/2014</a:t>
             </a:fld>
             <a:endParaRPr lang="en-US"/>
           </a:p>
@@ -656,9 +631,7 @@
       <p:sp>
         <p:nvSpPr>
           <p:cNvPr id="5" name="Footer Placeholder 4"/>
-          <p:cNvSpPr>
-            <a:spLocks noGrp="1"/>
-          </p:cNvSpPr>
+          <p:cNvSpPr/>
           <p:nvPr>
             <p:ph type="ftr" sz="quarter" idx="11"/>
           </p:nvPr>
@@ -675,9 +648,7 @@
       <p:sp>
         <p:nvSpPr>
           <p:cNvPr id="6" name="Slide Number Placeholder 5"/>
-          <p:cNvSpPr>
-            <a:spLocks noGrp="1"/>
-          </p:cNvSpPr>
+          <p:cNvSpPr/>
           <p:nvPr>
             <p:ph type="sldNum" sz="quarter" idx="12"/>
           </p:nvPr>
@@ -689,6 +660,7 @@
           <a:p>
             <a:fld id="{93AE1883-0942-4AA3-9DB2-9C7C3A0314B1}" type="slidenum">
               <a:rPr lang="en-US" smtClean="0"/>
+              <a:t>‹#›</a:t>
             </a:fld>
             <a:endParaRPr lang="en-US"/>
           </a:p>
@@ -699,11 +671,11 @@
   <p:clrMapOvr>
     <a:masterClrMapping/>
   </p:clrMapOvr>
-  <p:transition/>
+  <p:transition spd="fast"/>
   <p:timing>
     <p:tnLst>
       <p:par>
-        <p:cTn id="1" dur="indefinite" restart="never" nodeType="tmRoot"/>
+        <p:cTn id="1" restart="never" nodeType="tmRoot"/>
       </p:par>
     </p:tnLst>
   </p:timing>
@@ -730,9 +702,7 @@
       <p:sp>
         <p:nvSpPr>
           <p:cNvPr id="2" name="Title 1"/>
-          <p:cNvSpPr>
-            <a:spLocks noGrp="1"/>
-          </p:cNvSpPr>
+          <p:cNvSpPr/>
           <p:nvPr>
             <p:ph type="title"/>
           </p:nvPr>
@@ -743,7 +713,7 @@
           <a:lstStyle/>
           <a:p>
             <a:r>
-              <a:rPr lang="en-US" smtClean="0"/>
+              <a:rPr lang="en-US" dirty="1" smtClean="0"/>
               <a:t>Click to edit Master title style</a:t>
             </a:r>
             <a:endParaRPr lang="en-US"/>
@@ -753,11 +723,9 @@
       <p:sp>
         <p:nvSpPr>
           <p:cNvPr id="3" name="Content Placeholder 2"/>
-          <p:cNvSpPr>
-            <a:spLocks noGrp="1"/>
-          </p:cNvSpPr>
-          <p:nvPr>
-            <p:ph idx="1"/>
+          <p:cNvSpPr/>
+          <p:nvPr>
+            <p:ph type="obj" idx="1"/>
           </p:nvPr>
         </p:nvSpPr>
         <p:spPr/>
@@ -767,39 +735,35 @@
           <a:p>
             <a:pPr lvl="0"/>
             <a:r>
-              <a:rPr lang="en-US" smtClean="0"/>
+              <a:rPr lang="en-US" dirty="1" smtClean="0"/>
               <a:t>Click to edit Master text styles</a:t>
             </a:r>
-            <a:endParaRPr lang="en-US" smtClean="0"/>
           </a:p>
           <a:p>
             <a:pPr lvl="1"/>
             <a:r>
-              <a:rPr lang="en-US" smtClean="0"/>
+              <a:rPr lang="en-US" dirty="1" smtClean="0"/>
               <a:t>Second level</a:t>
             </a:r>
-            <a:endParaRPr lang="en-US" smtClean="0"/>
           </a:p>
           <a:p>
             <a:pPr lvl="2"/>
             <a:r>
-              <a:rPr lang="en-US" smtClean="0"/>
+              <a:rPr lang="en-US" dirty="1" smtClean="0"/>
               <a:t>Third level</a:t>
             </a:r>
-            <a:endParaRPr lang="en-US" smtClean="0"/>
           </a:p>
           <a:p>
             <a:pPr lvl="3"/>
             <a:r>
-              <a:rPr lang="en-US" smtClean="0"/>
+              <a:rPr lang="en-US" dirty="1" smtClean="0"/>
               <a:t>Fourth level</a:t>
             </a:r>
-            <a:endParaRPr lang="en-US" smtClean="0"/>
           </a:p>
           <a:p>
             <a:pPr lvl="4"/>
             <a:r>
-              <a:rPr lang="en-US" smtClean="0"/>
+              <a:rPr lang="en-US" dirty="1" smtClean="0"/>
               <a:t>Fifth level</a:t>
             </a:r>
             <a:endParaRPr lang="en-US"/>
@@ -809,9 +773,7 @@
       <p:sp>
         <p:nvSpPr>
           <p:cNvPr id="4" name="Date Placeholder 3"/>
-          <p:cNvSpPr>
-            <a:spLocks noGrp="1"/>
-          </p:cNvSpPr>
+          <p:cNvSpPr/>
           <p:nvPr>
             <p:ph type="dt" sz="half" idx="10"/>
           </p:nvPr>
@@ -823,6 +785,7 @@
           <a:p>
             <a:fld id="{E8FD0B7A-F5DD-4F40-B4CB-3B2C354B893A}" type="datetimeFigureOut">
               <a:rPr lang="en-US" smtClean="0"/>
+              <a:t>3/4/2014</a:t>
             </a:fld>
             <a:endParaRPr lang="en-US"/>
           </a:p>
@@ -831,9 +794,7 @@
       <p:sp>
         <p:nvSpPr>
           <p:cNvPr id="5" name="Footer Placeholder 4"/>
-          <p:cNvSpPr>
-            <a:spLocks noGrp="1"/>
-          </p:cNvSpPr>
+          <p:cNvSpPr/>
           <p:nvPr>
             <p:ph type="ftr" sz="quarter" idx="11"/>
           </p:nvPr>
@@ -850,9 +811,7 @@
       <p:sp>
         <p:nvSpPr>
           <p:cNvPr id="6" name="Slide Number Placeholder 5"/>
-          <p:cNvSpPr>
-            <a:spLocks noGrp="1"/>
-          </p:cNvSpPr>
+          <p:cNvSpPr/>
           <p:nvPr>
             <p:ph type="sldNum" sz="quarter" idx="12"/>
           </p:nvPr>
@@ -864,6 +823,7 @@
           <a:p>
             <a:fld id="{93AE1883-0942-4AA3-9DB2-9C7C3A0314B1}" type="slidenum">
               <a:rPr lang="en-US" smtClean="0"/>
+              <a:t>‹#›</a:t>
             </a:fld>
             <a:endParaRPr lang="en-US"/>
           </a:p>
@@ -874,11 +834,11 @@
   <p:clrMapOvr>
     <a:masterClrMapping/>
   </p:clrMapOvr>
-  <p:transition/>
+  <p:transition spd="fast"/>
   <p:timing>
     <p:tnLst>
       <p:par>
-        <p:cTn id="1" dur="indefinite" restart="never" nodeType="tmRoot"/>
+        <p:cTn id="1" restart="never" nodeType="tmRoot"/>
       </p:par>
     </p:tnLst>
   </p:timing>
@@ -905,9 +865,7 @@
       <p:sp>
         <p:nvSpPr>
           <p:cNvPr id="2" name="Title 1"/>
-          <p:cNvSpPr>
-            <a:spLocks noGrp="1"/>
-          </p:cNvSpPr>
+          <p:cNvSpPr/>
           <p:nvPr>
             <p:ph type="title"/>
           </p:nvPr>
@@ -927,7 +885,7 @@
           </a:lstStyle>
           <a:p>
             <a:r>
-              <a:rPr lang="en-US" smtClean="0"/>
+              <a:rPr lang="en-US" dirty="1" smtClean="0"/>
               <a:t>Click to edit Master title style</a:t>
             </a:r>
             <a:endParaRPr lang="en-US"/>
@@ -937,9 +895,7 @@
       <p:sp>
         <p:nvSpPr>
           <p:cNvPr id="3" name="Text Placeholder 2"/>
-          <p:cNvSpPr>
-            <a:spLocks noGrp="1"/>
-          </p:cNvSpPr>
+          <p:cNvSpPr/>
           <p:nvPr>
             <p:ph type="body" idx="1"/>
           </p:nvPr>
@@ -1047,19 +1003,16 @@
           <a:p>
             <a:pPr lvl="0"/>
             <a:r>
-              <a:rPr lang="en-US" smtClean="0"/>
+              <a:rPr lang="en-US" dirty="1" smtClean="0"/>
               <a:t>Click to edit Master text styles</a:t>
             </a:r>
-            <a:endParaRPr lang="en-US" smtClean="0"/>
           </a:p>
         </p:txBody>
       </p:sp>
       <p:sp>
         <p:nvSpPr>
           <p:cNvPr id="4" name="Date Placeholder 3"/>
-          <p:cNvSpPr>
-            <a:spLocks noGrp="1"/>
-          </p:cNvSpPr>
+          <p:cNvSpPr/>
           <p:nvPr>
             <p:ph type="dt" sz="half" idx="10"/>
           </p:nvPr>
@@ -1071,6 +1024,7 @@
           <a:p>
             <a:fld id="{E8FD0B7A-F5DD-4F40-B4CB-3B2C354B893A}" type="datetimeFigureOut">
               <a:rPr lang="en-US" smtClean="0"/>
+              <a:t>3/4/2014</a:t>
             </a:fld>
             <a:endParaRPr lang="en-US"/>
           </a:p>
@@ -1079,9 +1033,7 @@
       <p:sp>
         <p:nvSpPr>
           <p:cNvPr id="5" name="Footer Placeholder 4"/>
-          <p:cNvSpPr>
-            <a:spLocks noGrp="1"/>
-          </p:cNvSpPr>
+          <p:cNvSpPr/>
           <p:nvPr>
             <p:ph type="ftr" sz="quarter" idx="11"/>
           </p:nvPr>
@@ -1098,9 +1050,7 @@
       <p:sp>
         <p:nvSpPr>
           <p:cNvPr id="6" name="Slide Number Placeholder 5"/>
-          <p:cNvSpPr>
-            <a:spLocks noGrp="1"/>
-          </p:cNvSpPr>
+          <p:cNvSpPr/>
           <p:nvPr>
             <p:ph type="sldNum" sz="quarter" idx="12"/>
           </p:nvPr>
@@ -1112,6 +1062,7 @@
           <a:p>
             <a:fld id="{93AE1883-0942-4AA3-9DB2-9C7C3A0314B1}" type="slidenum">
               <a:rPr lang="en-US" smtClean="0"/>
+              <a:t>‹#›</a:t>
             </a:fld>
             <a:endParaRPr lang="en-US"/>
           </a:p>
@@ -1122,11 +1073,11 @@
   <p:clrMapOvr>
     <a:masterClrMapping/>
   </p:clrMapOvr>
-  <p:transition/>
+  <p:transition spd="fast"/>
   <p:timing>
     <p:tnLst>
       <p:par>
-        <p:cTn id="1" dur="indefinite" restart="never" nodeType="tmRoot"/>
+        <p:cTn id="1" restart="never" nodeType="tmRoot"/>
       </p:par>
     </p:tnLst>
   </p:timing>
@@ -1153,9 +1104,7 @@
       <p:sp>
         <p:nvSpPr>
           <p:cNvPr id="2" name="Title 1"/>
-          <p:cNvSpPr>
-            <a:spLocks noGrp="1"/>
-          </p:cNvSpPr>
+          <p:cNvSpPr/>
           <p:nvPr>
             <p:ph type="title"/>
           </p:nvPr>
@@ -1166,7 +1115,7 @@
           <a:lstStyle/>
           <a:p>
             <a:r>
-              <a:rPr lang="en-US" smtClean="0"/>
+              <a:rPr lang="en-US" dirty="1" smtClean="0"/>
               <a:t>Click to edit Master title style</a:t>
             </a:r>
             <a:endParaRPr lang="en-US"/>
@@ -1176,11 +1125,9 @@
       <p:sp>
         <p:nvSpPr>
           <p:cNvPr id="3" name="Content Placeholder 2"/>
-          <p:cNvSpPr>
-            <a:spLocks noGrp="1"/>
-          </p:cNvSpPr>
-          <p:nvPr>
-            <p:ph sz="half" idx="1"/>
+          <p:cNvSpPr/>
+          <p:nvPr>
+            <p:ph type="obj" sz="half" idx="1"/>
           </p:nvPr>
         </p:nvSpPr>
         <p:spPr>
@@ -1223,39 +1170,35 @@
           <a:p>
             <a:pPr lvl="0"/>
             <a:r>
-              <a:rPr lang="en-US" smtClean="0"/>
+              <a:rPr lang="en-US" dirty="1" smtClean="0"/>
               <a:t>Click to edit Master text styles</a:t>
             </a:r>
-            <a:endParaRPr lang="en-US" smtClean="0"/>
           </a:p>
           <a:p>
             <a:pPr lvl="1"/>
             <a:r>
-              <a:rPr lang="en-US" smtClean="0"/>
+              <a:rPr lang="en-US" dirty="1" smtClean="0"/>
               <a:t>Second level</a:t>
             </a:r>
-            <a:endParaRPr lang="en-US" smtClean="0"/>
           </a:p>
           <a:p>
             <a:pPr lvl="2"/>
             <a:r>
-              <a:rPr lang="en-US" smtClean="0"/>
+              <a:rPr lang="en-US" dirty="1" smtClean="0"/>
               <a:t>Third level</a:t>
             </a:r>
-            <a:endParaRPr lang="en-US" smtClean="0"/>
           </a:p>
           <a:p>
             <a:pPr lvl="3"/>
             <a:r>
-              <a:rPr lang="en-US" smtClean="0"/>
+              <a:rPr lang="en-US" dirty="1" smtClean="0"/>
               <a:t>Fourth level</a:t>
             </a:r>
-            <a:endParaRPr lang="en-US" smtClean="0"/>
           </a:p>
           <a:p>
             <a:pPr lvl="4"/>
             <a:r>
-              <a:rPr lang="en-US" smtClean="0"/>
+              <a:rPr lang="en-US" dirty="1" smtClean="0"/>
               <a:t>Fifth level</a:t>
             </a:r>
             <a:endParaRPr lang="en-US"/>
@@ -1265,11 +1208,9 @@
       <p:sp>
         <p:nvSpPr>
           <p:cNvPr id="4" name="Content Placeholder 3"/>
-          <p:cNvSpPr>
-            <a:spLocks noGrp="1"/>
-          </p:cNvSpPr>
-          <p:nvPr>
-            <p:ph sz="half" idx="2"/>
+          <p:cNvSpPr/>
+          <p:nvPr>
+            <p:ph type="obj" sz="half" idx="2"/>
           </p:nvPr>
         </p:nvSpPr>
         <p:spPr>
@@ -1312,39 +1253,35 @@
           <a:p>
             <a:pPr lvl="0"/>
             <a:r>
-              <a:rPr lang="en-US" smtClean="0"/>
+              <a:rPr lang="en-US" dirty="1" smtClean="0"/>
               <a:t>Click to edit Master text styles</a:t>
             </a:r>
-            <a:endParaRPr lang="en-US" smtClean="0"/>
           </a:p>
           <a:p>
             <a:pPr lvl="1"/>
             <a:r>
-              <a:rPr lang="en-US" smtClean="0"/>
+              <a:rPr lang="en-US" dirty="1" smtClean="0"/>
               <a:t>Second level</a:t>
             </a:r>
-            <a:endParaRPr lang="en-US" smtClean="0"/>
           </a:p>
           <a:p>
             <a:pPr lvl="2"/>
             <a:r>
-              <a:rPr lang="en-US" smtClean="0"/>
+              <a:rPr lang="en-US" dirty="1" smtClean="0"/>
               <a:t>Third level</a:t>
             </a:r>
-            <a:endParaRPr lang="en-US" smtClean="0"/>
           </a:p>
           <a:p>
             <a:pPr lvl="3"/>
             <a:r>
-              <a:rPr lang="en-US" smtClean="0"/>
+              <a:rPr lang="en-US" dirty="1" smtClean="0"/>
               <a:t>Fourth level</a:t>
             </a:r>
-            <a:endParaRPr lang="en-US" smtClean="0"/>
           </a:p>
           <a:p>
             <a:pPr lvl="4"/>
             <a:r>
-              <a:rPr lang="en-US" smtClean="0"/>
+              <a:rPr lang="en-US" dirty="1" smtClean="0"/>
               <a:t>Fifth level</a:t>
             </a:r>
             <a:endParaRPr lang="en-US"/>
@@ -1354,9 +1291,7 @@
       <p:sp>
         <p:nvSpPr>
           <p:cNvPr id="5" name="Date Placeholder 4"/>
-          <p:cNvSpPr>
-            <a:spLocks noGrp="1"/>
-          </p:cNvSpPr>
+          <p:cNvSpPr/>
           <p:nvPr>
             <p:ph type="dt" sz="half" idx="10"/>
           </p:nvPr>
@@ -1368,6 +1303,7 @@
           <a:p>
             <a:fld id="{E8FD0B7A-F5DD-4F40-B4CB-3B2C354B893A}" type="datetimeFigureOut">
               <a:rPr lang="en-US" smtClean="0"/>
+              <a:t>3/4/2014</a:t>
             </a:fld>
             <a:endParaRPr lang="en-US"/>
           </a:p>
@@ -1376,9 +1312,7 @@
       <p:sp>
         <p:nvSpPr>
           <p:cNvPr id="6" name="Footer Placeholder 5"/>
-          <p:cNvSpPr>
-            <a:spLocks noGrp="1"/>
-          </p:cNvSpPr>
+          <p:cNvSpPr/>
           <p:nvPr>
             <p:ph type="ftr" sz="quarter" idx="11"/>
           </p:nvPr>
@@ -1395,9 +1329,7 @@
       <p:sp>
         <p:nvSpPr>
           <p:cNvPr id="7" name="Slide Number Placeholder 6"/>
-          <p:cNvSpPr>
-            <a:spLocks noGrp="1"/>
-          </p:cNvSpPr>
+          <p:cNvSpPr/>
           <p:nvPr>
             <p:ph type="sldNum" sz="quarter" idx="12"/>
           </p:nvPr>
@@ -1409,6 +1341,7 @@
           <a:p>
             <a:fld id="{93AE1883-0942-4AA3-9DB2-9C7C3A0314B1}" type="slidenum">
               <a:rPr lang="en-US" smtClean="0"/>
+              <a:t>‹#›</a:t>
             </a:fld>
             <a:endParaRPr lang="en-US"/>
           </a:p>
@@ -1419,11 +1352,11 @@
   <p:clrMapOvr>
     <a:masterClrMapping/>
   </p:clrMapOvr>
-  <p:transition/>
+  <p:transition spd="fast"/>
   <p:timing>
     <p:tnLst>
       <p:par>
-        <p:cTn id="1" dur="indefinite" restart="never" nodeType="tmRoot"/>
+        <p:cTn id="1" restart="never" nodeType="tmRoot"/>
       </p:par>
     </p:tnLst>
   </p:timing>
@@ -1450,9 +1383,7 @@
       <p:sp>
         <p:nvSpPr>
           <p:cNvPr id="2" name="Title 1"/>
-          <p:cNvSpPr>
-            <a:spLocks noGrp="1"/>
-          </p:cNvSpPr>
+          <p:cNvSpPr/>
           <p:nvPr>
             <p:ph type="title"/>
           </p:nvPr>
@@ -1460,10 +1391,14 @@
         <p:spPr/>
         <p:txBody>
           <a:bodyPr/>
-          <a:lstStyle/>
-          <a:p>
-            <a:r>
-              <a:rPr lang="en-US" smtClean="0"/>
+          <a:lstStyle>
+            <a:lvl1pPr>
+              <a:defRPr/>
+            </a:lvl1pPr>
+          </a:lstStyle>
+          <a:p>
+            <a:r>
+              <a:rPr lang="en-US" dirty="1" smtClean="0"/>
               <a:t>Click to edit Master title style</a:t>
             </a:r>
             <a:endParaRPr lang="en-US"/>
@@ -1473,9 +1408,7 @@
       <p:sp>
         <p:nvSpPr>
           <p:cNvPr id="3" name="Text Placeholder 2"/>
-          <p:cNvSpPr>
-            <a:spLocks noGrp="1"/>
-          </p:cNvSpPr>
+          <p:cNvSpPr/>
           <p:nvPr>
             <p:ph type="body" idx="1"/>
           </p:nvPr>
@@ -1529,21 +1462,18 @@
           <a:p>
             <a:pPr lvl="0"/>
             <a:r>
-              <a:rPr lang="en-US" smtClean="0"/>
+              <a:rPr lang="en-US" dirty="1" smtClean="0"/>
               <a:t>Click to edit Master text styles</a:t>
             </a:r>
-            <a:endParaRPr lang="en-US" smtClean="0"/>
           </a:p>
         </p:txBody>
       </p:sp>
       <p:sp>
         <p:nvSpPr>
           <p:cNvPr id="4" name="Content Placeholder 3"/>
-          <p:cNvSpPr>
-            <a:spLocks noGrp="1"/>
-          </p:cNvSpPr>
-          <p:nvPr>
-            <p:ph sz="half" idx="2"/>
+          <p:cNvSpPr/>
+          <p:nvPr>
+            <p:ph type="obj" sz="half" idx="2"/>
           </p:nvPr>
         </p:nvSpPr>
         <p:spPr>
@@ -1586,39 +1516,35 @@
           <a:p>
             <a:pPr lvl="0"/>
             <a:r>
-              <a:rPr lang="en-US" smtClean="0"/>
+              <a:rPr lang="en-US" dirty="1" smtClean="0"/>
               <a:t>Click to edit Master text styles</a:t>
             </a:r>
-            <a:endParaRPr lang="en-US" smtClean="0"/>
           </a:p>
           <a:p>
             <a:pPr lvl="1"/>
             <a:r>
-              <a:rPr lang="en-US" smtClean="0"/>
+              <a:rPr lang="en-US" dirty="1" smtClean="0"/>
               <a:t>Second level</a:t>
             </a:r>
-            <a:endParaRPr lang="en-US" smtClean="0"/>
           </a:p>
           <a:p>
             <a:pPr lvl="2"/>
             <a:r>
-              <a:rPr lang="en-US" smtClean="0"/>
+              <a:rPr lang="en-US" dirty="1" smtClean="0"/>
               <a:t>Third level</a:t>
             </a:r>
-            <a:endParaRPr lang="en-US" smtClean="0"/>
           </a:p>
           <a:p>
             <a:pPr lvl="3"/>
             <a:r>
-              <a:rPr lang="en-US" smtClean="0"/>
+              <a:rPr lang="en-US" dirty="1" smtClean="0"/>
               <a:t>Fourth level</a:t>
             </a:r>
-            <a:endParaRPr lang="en-US" smtClean="0"/>
           </a:p>
           <a:p>
             <a:pPr lvl="4"/>
             <a:r>
-              <a:rPr lang="en-US" smtClean="0"/>
+              <a:rPr lang="en-US" dirty="1" smtClean="0"/>
               <a:t>Fifth level</a:t>
             </a:r>
             <a:endParaRPr lang="en-US"/>
@@ -1628,9 +1554,7 @@
       <p:sp>
         <p:nvSpPr>
           <p:cNvPr id="5" name="Text Placeholder 4"/>
-          <p:cNvSpPr>
-            <a:spLocks noGrp="1"/>
-          </p:cNvSpPr>
+          <p:cNvSpPr/>
           <p:nvPr>
             <p:ph type="body" sz="quarter" idx="3"/>
           </p:nvPr>
@@ -1684,21 +1608,18 @@
           <a:p>
             <a:pPr lvl="0"/>
             <a:r>
-              <a:rPr lang="en-US" smtClean="0"/>
+              <a:rPr lang="en-US" dirty="1" smtClean="0"/>
               <a:t>Click to edit Master text styles</a:t>
             </a:r>
-            <a:endParaRPr lang="en-US" smtClean="0"/>
           </a:p>
         </p:txBody>
       </p:sp>
       <p:sp>
         <p:nvSpPr>
           <p:cNvPr id="6" name="Content Placeholder 5"/>
-          <p:cNvSpPr>
-            <a:spLocks noGrp="1"/>
-          </p:cNvSpPr>
-          <p:nvPr>
-            <p:ph sz="quarter" idx="4"/>
+          <p:cNvSpPr/>
+          <p:nvPr>
+            <p:ph type="obj" sz="quarter" idx="4"/>
           </p:nvPr>
         </p:nvSpPr>
         <p:spPr>
@@ -1741,39 +1662,35 @@
           <a:p>
             <a:pPr lvl="0"/>
             <a:r>
-              <a:rPr lang="en-US" smtClean="0"/>
+              <a:rPr lang="en-US" dirty="1" smtClean="0"/>
               <a:t>Click to edit Master text styles</a:t>
             </a:r>
-            <a:endParaRPr lang="en-US" smtClean="0"/>
           </a:p>
           <a:p>
             <a:pPr lvl="1"/>
             <a:r>
-              <a:rPr lang="en-US" smtClean="0"/>
+              <a:rPr lang="en-US" dirty="1" smtClean="0"/>
               <a:t>Second level</a:t>
             </a:r>
-            <a:endParaRPr lang="en-US" smtClean="0"/>
           </a:p>
           <a:p>
             <a:pPr lvl="2"/>
             <a:r>
-              <a:rPr lang="en-US" smtClean="0"/>
+              <a:rPr lang="en-US" dirty="1" smtClean="0"/>
               <a:t>Third level</a:t>
             </a:r>
-            <a:endParaRPr lang="en-US" smtClean="0"/>
           </a:p>
           <a:p>
             <a:pPr lvl="3"/>
             <a:r>
-              <a:rPr lang="en-US" smtClean="0"/>
+              <a:rPr lang="en-US" dirty="1" smtClean="0"/>
               <a:t>Fourth level</a:t>
             </a:r>
-            <a:endParaRPr lang="en-US" smtClean="0"/>
           </a:p>
           <a:p>
             <a:pPr lvl="4"/>
             <a:r>
-              <a:rPr lang="en-US" smtClean="0"/>
+              <a:rPr lang="en-US" dirty="1" smtClean="0"/>
               <a:t>Fifth level</a:t>
             </a:r>
             <a:endParaRPr lang="en-US"/>
@@ -1783,9 +1700,7 @@
       <p:sp>
         <p:nvSpPr>
           <p:cNvPr id="7" name="Date Placeholder 6"/>
-          <p:cNvSpPr>
-            <a:spLocks noGrp="1"/>
-          </p:cNvSpPr>
+          <p:cNvSpPr/>
           <p:nvPr>
             <p:ph type="dt" sz="half" idx="10"/>
           </p:nvPr>
@@ -1797,6 +1712,7 @@
           <a:p>
             <a:fld id="{E8FD0B7A-F5DD-4F40-B4CB-3B2C354B893A}" type="datetimeFigureOut">
               <a:rPr lang="en-US" smtClean="0"/>
+              <a:t>3/4/2014</a:t>
             </a:fld>
             <a:endParaRPr lang="en-US"/>
           </a:p>
@@ -1805,9 +1721,7 @@
       <p:sp>
         <p:nvSpPr>
           <p:cNvPr id="8" name="Footer Placeholder 7"/>
-          <p:cNvSpPr>
-            <a:spLocks noGrp="1"/>
-          </p:cNvSpPr>
+          <p:cNvSpPr/>
           <p:nvPr>
             <p:ph type="ftr" sz="quarter" idx="11"/>
           </p:nvPr>
@@ -1824,9 +1738,7 @@
       <p:sp>
         <p:nvSpPr>
           <p:cNvPr id="9" name="Slide Number Placeholder 8"/>
-          <p:cNvSpPr>
-            <a:spLocks noGrp="1"/>
-          </p:cNvSpPr>
+          <p:cNvSpPr/>
           <p:nvPr>
             <p:ph type="sldNum" sz="quarter" idx="12"/>
           </p:nvPr>
@@ -1838,6 +1750,7 @@
           <a:p>
             <a:fld id="{93AE1883-0942-4AA3-9DB2-9C7C3A0314B1}" type="slidenum">
               <a:rPr lang="en-US" smtClean="0"/>
+              <a:t>‹#›</a:t>
             </a:fld>
             <a:endParaRPr lang="en-US"/>
           </a:p>
@@ -1848,11 +1761,11 @@
   <p:clrMapOvr>
     <a:masterClrMapping/>
   </p:clrMapOvr>
-  <p:transition/>
+  <p:transition spd="fast"/>
   <p:timing>
     <p:tnLst>
       <p:par>
-        <p:cTn id="1" dur="indefinite" restart="never" nodeType="tmRoot"/>
+        <p:cTn id="1" restart="never" nodeType="tmRoot"/>
       </p:par>
     </p:tnLst>
   </p:timing>
@@ -1879,9 +1792,7 @@
       <p:sp>
         <p:nvSpPr>
           <p:cNvPr id="2" name="Title 1"/>
-          <p:cNvSpPr>
-            <a:spLocks noGrp="1"/>
-          </p:cNvSpPr>
+          <p:cNvSpPr/>
           <p:nvPr>
             <p:ph type="title"/>
           </p:nvPr>
@@ -1892,7 +1803,7 @@
           <a:lstStyle/>
           <a:p>
             <a:r>
-              <a:rPr lang="en-US" smtClean="0"/>
+              <a:rPr lang="en-US" dirty="1" smtClean="0"/>
               <a:t>Click to edit Master title style</a:t>
             </a:r>
             <a:endParaRPr lang="en-US"/>
@@ -1902,9 +1813,7 @@
       <p:sp>
         <p:nvSpPr>
           <p:cNvPr id="3" name="Date Placeholder 2"/>
-          <p:cNvSpPr>
-            <a:spLocks noGrp="1"/>
-          </p:cNvSpPr>
+          <p:cNvSpPr/>
           <p:nvPr>
             <p:ph type="dt" sz="half" idx="10"/>
           </p:nvPr>
@@ -1916,6 +1825,7 @@
           <a:p>
             <a:fld id="{E8FD0B7A-F5DD-4F40-B4CB-3B2C354B893A}" type="datetimeFigureOut">
               <a:rPr lang="en-US" smtClean="0"/>
+              <a:t>3/4/2014</a:t>
             </a:fld>
             <a:endParaRPr lang="en-US"/>
           </a:p>
@@ -1924,9 +1834,7 @@
       <p:sp>
         <p:nvSpPr>
           <p:cNvPr id="4" name="Footer Placeholder 3"/>
-          <p:cNvSpPr>
-            <a:spLocks noGrp="1"/>
-          </p:cNvSpPr>
+          <p:cNvSpPr/>
           <p:nvPr>
             <p:ph type="ftr" sz="quarter" idx="11"/>
           </p:nvPr>
@@ -1943,9 +1851,7 @@
       <p:sp>
         <p:nvSpPr>
           <p:cNvPr id="5" name="Slide Number Placeholder 4"/>
-          <p:cNvSpPr>
-            <a:spLocks noGrp="1"/>
-          </p:cNvSpPr>
+          <p:cNvSpPr/>
           <p:nvPr>
             <p:ph type="sldNum" sz="quarter" idx="12"/>
           </p:nvPr>
@@ -1957,6 +1863,7 @@
           <a:p>
             <a:fld id="{93AE1883-0942-4AA3-9DB2-9C7C3A0314B1}" type="slidenum">
               <a:rPr lang="en-US" smtClean="0"/>
+              <a:t>‹#›</a:t>
             </a:fld>
             <a:endParaRPr lang="en-US"/>
           </a:p>
@@ -1967,11 +1874,11 @@
   <p:clrMapOvr>
     <a:masterClrMapping/>
   </p:clrMapOvr>
-  <p:transition/>
+  <p:transition spd="fast"/>
   <p:timing>
     <p:tnLst>
       <p:par>
-        <p:cTn id="1" dur="indefinite" restart="never" nodeType="tmRoot"/>
+        <p:cTn id="1" restart="never" nodeType="tmRoot"/>
       </p:par>
     </p:tnLst>
   </p:timing>
@@ -1998,9 +1905,7 @@
       <p:sp>
         <p:nvSpPr>
           <p:cNvPr id="2" name="Date Placeholder 1"/>
-          <p:cNvSpPr>
-            <a:spLocks noGrp="1"/>
-          </p:cNvSpPr>
+          <p:cNvSpPr/>
           <p:nvPr>
             <p:ph type="dt" sz="half" idx="10"/>
           </p:nvPr>
@@ -2012,6 +1917,7 @@
           <a:p>
             <a:fld id="{E8FD0B7A-F5DD-4F40-B4CB-3B2C354B893A}" type="datetimeFigureOut">
               <a:rPr lang="en-US" smtClean="0"/>
+              <a:t>3/4/2014</a:t>
             </a:fld>
             <a:endParaRPr lang="en-US"/>
           </a:p>
@@ -2020,9 +1926,7 @@
       <p:sp>
         <p:nvSpPr>
           <p:cNvPr id="3" name="Footer Placeholder 2"/>
-          <p:cNvSpPr>
-            <a:spLocks noGrp="1"/>
-          </p:cNvSpPr>
+          <p:cNvSpPr/>
           <p:nvPr>
             <p:ph type="ftr" sz="quarter" idx="11"/>
           </p:nvPr>
@@ -2039,9 +1943,7 @@
       <p:sp>
         <p:nvSpPr>
           <p:cNvPr id="4" name="Slide Number Placeholder 3"/>
-          <p:cNvSpPr>
-            <a:spLocks noGrp="1"/>
-          </p:cNvSpPr>
+          <p:cNvSpPr/>
           <p:nvPr>
             <p:ph type="sldNum" sz="quarter" idx="12"/>
           </p:nvPr>
@@ -2053,6 +1955,7 @@
           <a:p>
             <a:fld id="{93AE1883-0942-4AA3-9DB2-9C7C3A0314B1}" type="slidenum">
               <a:rPr lang="en-US" smtClean="0"/>
+              <a:t>‹#›</a:t>
             </a:fld>
             <a:endParaRPr lang="en-US"/>
           </a:p>
@@ -2063,11 +1966,11 @@
   <p:clrMapOvr>
     <a:masterClrMapping/>
   </p:clrMapOvr>
-  <p:transition/>
+  <p:transition spd="fast"/>
   <p:timing>
     <p:tnLst>
       <p:par>
-        <p:cTn id="1" dur="indefinite" restart="never" nodeType="tmRoot"/>
+        <p:cTn id="1" restart="never" nodeType="tmRoot"/>
       </p:par>
     </p:tnLst>
   </p:timing>
@@ -2094,9 +1997,7 @@
       <p:sp>
         <p:nvSpPr>
           <p:cNvPr id="2" name="Title 1"/>
-          <p:cNvSpPr>
-            <a:spLocks noGrp="1"/>
-          </p:cNvSpPr>
+          <p:cNvSpPr/>
           <p:nvPr>
             <p:ph type="title"/>
           </p:nvPr>
@@ -2116,7 +2017,7 @@
           </a:lstStyle>
           <a:p>
             <a:r>
-              <a:rPr lang="en-US" smtClean="0"/>
+              <a:rPr lang="en-US" dirty="1" smtClean="0"/>
               <a:t>Click to edit Master title style</a:t>
             </a:r>
             <a:endParaRPr lang="en-US"/>
@@ -2126,11 +2027,9 @@
       <p:sp>
         <p:nvSpPr>
           <p:cNvPr id="3" name="Content Placeholder 2"/>
-          <p:cNvSpPr>
-            <a:spLocks noGrp="1"/>
-          </p:cNvSpPr>
-          <p:nvPr>
-            <p:ph idx="1"/>
+          <p:cNvSpPr/>
+          <p:nvPr>
+            <p:ph type="obj" idx="1"/>
           </p:nvPr>
         </p:nvSpPr>
         <p:spPr>
@@ -2173,39 +2072,35 @@
           <a:p>
             <a:pPr lvl="0"/>
             <a:r>
-              <a:rPr lang="en-US" smtClean="0"/>
+              <a:rPr lang="en-US" dirty="1" smtClean="0"/>
               <a:t>Click to edit Master text styles</a:t>
             </a:r>
-            <a:endParaRPr lang="en-US" smtClean="0"/>
           </a:p>
           <a:p>
             <a:pPr lvl="1"/>
             <a:r>
-              <a:rPr lang="en-US" smtClean="0"/>
+              <a:rPr lang="en-US" dirty="1" smtClean="0"/>
               <a:t>Second level</a:t>
             </a:r>
-            <a:endParaRPr lang="en-US" smtClean="0"/>
           </a:p>
           <a:p>
             <a:pPr lvl="2"/>
             <a:r>
-              <a:rPr lang="en-US" smtClean="0"/>
+              <a:rPr lang="en-US" dirty="1" smtClean="0"/>
               <a:t>Third level</a:t>
             </a:r>
-            <a:endParaRPr lang="en-US" smtClean="0"/>
           </a:p>
           <a:p>
             <a:pPr lvl="3"/>
             <a:r>
-              <a:rPr lang="en-US" smtClean="0"/>
+              <a:rPr lang="en-US" dirty="1" smtClean="0"/>
               <a:t>Fourth level</a:t>
             </a:r>
-            <a:endParaRPr lang="en-US" smtClean="0"/>
           </a:p>
           <a:p>
             <a:pPr lvl="4"/>
             <a:r>
-              <a:rPr lang="en-US" smtClean="0"/>
+              <a:rPr lang="en-US" dirty="1" smtClean="0"/>
               <a:t>Fifth level</a:t>
             </a:r>
             <a:endParaRPr lang="en-US"/>
@@ -2215,9 +2110,7 @@
       <p:sp>
         <p:nvSpPr>
           <p:cNvPr id="4" name="Text Placeholder 3"/>
-          <p:cNvSpPr>
-            <a:spLocks noGrp="1"/>
-          </p:cNvSpPr>
+          <p:cNvSpPr/>
           <p:nvPr>
             <p:ph type="body" sz="half" idx="2"/>
           </p:nvPr>
@@ -2271,19 +2164,16 @@
           <a:p>
             <a:pPr lvl="0"/>
             <a:r>
-              <a:rPr lang="en-US" smtClean="0"/>
+              <a:rPr lang="en-US" dirty="1" smtClean="0"/>
               <a:t>Click to edit Master text styles</a:t>
             </a:r>
-            <a:endParaRPr lang="en-US" smtClean="0"/>
           </a:p>
         </p:txBody>
       </p:sp>
       <p:sp>
         <p:nvSpPr>
           <p:cNvPr id="5" name="Date Placeholder 4"/>
-          <p:cNvSpPr>
-            <a:spLocks noGrp="1"/>
-          </p:cNvSpPr>
+          <p:cNvSpPr/>
           <p:nvPr>
             <p:ph type="dt" sz="half" idx="10"/>
           </p:nvPr>
@@ -2295,6 +2185,7 @@
           <a:p>
             <a:fld id="{E8FD0B7A-F5DD-4F40-B4CB-3B2C354B893A}" type="datetimeFigureOut">
               <a:rPr lang="en-US" smtClean="0"/>
+              <a:t>3/4/2014</a:t>
             </a:fld>
             <a:endParaRPr lang="en-US"/>
           </a:p>
@@ -2303,9 +2194,7 @@
       <p:sp>
         <p:nvSpPr>
           <p:cNvPr id="6" name="Footer Placeholder 5"/>
-          <p:cNvSpPr>
-            <a:spLocks noGrp="1"/>
-          </p:cNvSpPr>
+          <p:cNvSpPr/>
           <p:nvPr>
             <p:ph type="ftr" sz="quarter" idx="11"/>
           </p:nvPr>
@@ -2322,9 +2211,7 @@
       <p:sp>
         <p:nvSpPr>
           <p:cNvPr id="7" name="Slide Number Placeholder 6"/>
-          <p:cNvSpPr>
-            <a:spLocks noGrp="1"/>
-          </p:cNvSpPr>
+          <p:cNvSpPr/>
           <p:nvPr>
             <p:ph type="sldNum" sz="quarter" idx="12"/>
           </p:nvPr>
@@ -2336,6 +2223,7 @@
           <a:p>
             <a:fld id="{93AE1883-0942-4AA3-9DB2-9C7C3A0314B1}" type="slidenum">
               <a:rPr lang="en-US" smtClean="0"/>
+              <a:t>‹#›</a:t>
             </a:fld>
             <a:endParaRPr lang="en-US"/>
           </a:p>
@@ -2346,11 +2234,11 @@
   <p:clrMapOvr>
     <a:masterClrMapping/>
   </p:clrMapOvr>
-  <p:transition/>
+  <p:transition spd="fast"/>
   <p:timing>
     <p:tnLst>
       <p:par>
-        <p:cTn id="1" dur="indefinite" restart="never" nodeType="tmRoot"/>
+        <p:cTn id="1" restart="never" nodeType="tmRoot"/>
       </p:par>
     </p:tnLst>
   </p:timing>
@@ -2377,9 +2265,7 @@
       <p:sp>
         <p:nvSpPr>
           <p:cNvPr id="2" name="Title 1"/>
-          <p:cNvSpPr>
-            <a:spLocks noGrp="1"/>
-          </p:cNvSpPr>
+          <p:cNvSpPr/>
           <p:nvPr>
             <p:ph type="title"/>
           </p:nvPr>
@@ -2399,7 +2285,7 @@
           </a:lstStyle>
           <a:p>
             <a:r>
-              <a:rPr lang="en-US" smtClean="0"/>
+              <a:rPr lang="en-US" dirty="1" smtClean="0"/>
               <a:t>Click to edit Master title style</a:t>
             </a:r>
             <a:endParaRPr lang="en-US"/>
@@ -2409,9 +2295,7 @@
       <p:sp>
         <p:nvSpPr>
           <p:cNvPr id="3" name="Picture Placeholder 2"/>
-          <p:cNvSpPr>
-            <a:spLocks noGrp="1"/>
-          </p:cNvSpPr>
+          <p:cNvSpPr/>
           <p:nvPr>
             <p:ph type="pic" idx="1"/>
           </p:nvPr>
@@ -2470,9 +2354,7 @@
       <p:sp>
         <p:nvSpPr>
           <p:cNvPr id="4" name="Text Placeholder 3"/>
-          <p:cNvSpPr>
-            <a:spLocks noGrp="1"/>
-          </p:cNvSpPr>
+          <p:cNvSpPr/>
           <p:nvPr>
             <p:ph type="body" sz="half" idx="2"/>
           </p:nvPr>
@@ -2526,19 +2408,16 @@
           <a:p>
             <a:pPr lvl="0"/>
             <a:r>
-              <a:rPr lang="en-US" smtClean="0"/>
+              <a:rPr lang="en-US" dirty="1" smtClean="0"/>
               <a:t>Click to edit Master text styles</a:t>
             </a:r>
-            <a:endParaRPr lang="en-US" smtClean="0"/>
           </a:p>
         </p:txBody>
       </p:sp>
       <p:sp>
         <p:nvSpPr>
           <p:cNvPr id="5" name="Date Placeholder 4"/>
-          <p:cNvSpPr>
-            <a:spLocks noGrp="1"/>
-          </p:cNvSpPr>
+          <p:cNvSpPr/>
           <p:nvPr>
             <p:ph type="dt" sz="half" idx="10"/>
           </p:nvPr>
@@ -2550,6 +2429,7 @@
           <a:p>
             <a:fld id="{E8FD0B7A-F5DD-4F40-B4CB-3B2C354B893A}" type="datetimeFigureOut">
               <a:rPr lang="en-US" smtClean="0"/>
+              <a:t>3/4/2014</a:t>
             </a:fld>
             <a:endParaRPr lang="en-US"/>
           </a:p>
@@ -2558,9 +2438,7 @@
       <p:sp>
         <p:nvSpPr>
           <p:cNvPr id="6" name="Footer Placeholder 5"/>
-          <p:cNvSpPr>
-            <a:spLocks noGrp="1"/>
-          </p:cNvSpPr>
+          <p:cNvSpPr/>
           <p:nvPr>
             <p:ph type="ftr" sz="quarter" idx="11"/>
           </p:nvPr>
@@ -2577,9 +2455,7 @@
       <p:sp>
         <p:nvSpPr>
           <p:cNvPr id="7" name="Slide Number Placeholder 6"/>
-          <p:cNvSpPr>
-            <a:spLocks noGrp="1"/>
-          </p:cNvSpPr>
+          <p:cNvSpPr/>
           <p:nvPr>
             <p:ph type="sldNum" sz="quarter" idx="12"/>
           </p:nvPr>
@@ -2591,6 +2467,7 @@
           <a:p>
             <a:fld id="{93AE1883-0942-4AA3-9DB2-9C7C3A0314B1}" type="slidenum">
               <a:rPr lang="en-US" smtClean="0"/>
+              <a:t>‹#›</a:t>
             </a:fld>
             <a:endParaRPr lang="en-US"/>
           </a:p>
@@ -2601,11 +2478,11 @@
   <p:clrMapOvr>
     <a:masterClrMapping/>
   </p:clrMapOvr>
-  <p:transition/>
+  <p:transition spd="fast"/>
   <p:timing>
     <p:tnLst>
       <p:par>
-        <p:cTn id="1" dur="indefinite" restart="never" nodeType="tmRoot"/>
+        <p:cTn id="1" restart="never" nodeType="tmRoot"/>
       </p:par>
     </p:tnLst>
   </p:timing>
@@ -2614,7 +2491,7 @@
 
 <file path=ppt/slideMasters/slideMaster1.xml><?xml version="1.0" encoding="utf-8"?>
 <p:sldMaster xmlns:a="http://schemas.openxmlformats.org/drawingml/2006/main" xmlns:r="http://schemas.openxmlformats.org/officeDocument/2006/relationships" xmlns:p="http://schemas.openxmlformats.org/presentationml/2006/main">
-  <p:cSld>
+  <p:cSld name="">
     <p:bg>
       <p:bgRef idx="1001">
         <a:schemeClr val="bg1"/>
@@ -2637,9 +2514,7 @@
       <p:sp>
         <p:nvSpPr>
           <p:cNvPr id="2" name="Title Placeholder 1"/>
-          <p:cNvSpPr>
-            <a:spLocks noGrp="1"/>
-          </p:cNvSpPr>
+          <p:cNvSpPr/>
           <p:nvPr>
             <p:ph type="title"/>
           </p:nvPr>
@@ -2649,9 +2524,7 @@
             <a:off x="457200" y="274638"/>
             <a:ext cx="8229600" cy="1143000"/>
           </a:xfrm>
-          <a:prstGeom prst="rect">
-            <a:avLst/>
-          </a:prstGeom>
+          <a:prstGeom prst="rect"/>
         </p:spPr>
         <p:txBody>
           <a:bodyPr vert="horz" lIns="91440" tIns="45720" rIns="91440" bIns="45720" rtlCol="0" anchor="ctr">
@@ -2660,7 +2533,7 @@
           <a:lstStyle/>
           <a:p>
             <a:r>
-              <a:rPr lang="en-US" smtClean="0"/>
+              <a:rPr lang="en-US" dirty="1" smtClean="0"/>
               <a:t>Click to edit Master title style</a:t>
             </a:r>
             <a:endParaRPr lang="en-US"/>
@@ -2670,9 +2543,7 @@
       <p:sp>
         <p:nvSpPr>
           <p:cNvPr id="3" name="Text Placeholder 2"/>
-          <p:cNvSpPr>
-            <a:spLocks noGrp="1"/>
-          </p:cNvSpPr>
+          <p:cNvSpPr/>
           <p:nvPr>
             <p:ph type="body" idx="1"/>
           </p:nvPr>
@@ -2682,9 +2553,7 @@
             <a:off x="457200" y="1600200"/>
             <a:ext cx="8229600" cy="4525963"/>
           </a:xfrm>
-          <a:prstGeom prst="rect">
-            <a:avLst/>
-          </a:prstGeom>
+          <a:prstGeom prst="rect"/>
         </p:spPr>
         <p:txBody>
           <a:bodyPr vert="horz" lIns="91440" tIns="45720" rIns="91440" bIns="45720" rtlCol="0">
@@ -2694,39 +2563,35 @@
           <a:p>
             <a:pPr lvl="0"/>
             <a:r>
-              <a:rPr lang="en-US" smtClean="0"/>
+              <a:rPr lang="en-US" dirty="1" smtClean="0"/>
               <a:t>Click to edit Master text styles</a:t>
             </a:r>
-            <a:endParaRPr lang="en-US" smtClean="0"/>
           </a:p>
           <a:p>
             <a:pPr lvl="1"/>
             <a:r>
-              <a:rPr lang="en-US" smtClean="0"/>
+              <a:rPr lang="en-US" dirty="1" smtClean="0"/>
               <a:t>Second level</a:t>
             </a:r>
-            <a:endParaRPr lang="en-US" smtClean="0"/>
           </a:p>
           <a:p>
             <a:pPr lvl="2"/>
             <a:r>
-              <a:rPr lang="en-US" smtClean="0"/>
+              <a:rPr lang="en-US" dirty="1" smtClean="0"/>
               <a:t>Third level</a:t>
             </a:r>
-            <a:endParaRPr lang="en-US" smtClean="0"/>
           </a:p>
           <a:p>
             <a:pPr lvl="3"/>
             <a:r>
-              <a:rPr lang="en-US" smtClean="0"/>
+              <a:rPr lang="en-US" dirty="1" smtClean="0"/>
               <a:t>Fourth level</a:t>
             </a:r>
-            <a:endParaRPr lang="en-US" smtClean="0"/>
           </a:p>
           <a:p>
             <a:pPr lvl="4"/>
             <a:r>
-              <a:rPr lang="en-US" smtClean="0"/>
+              <a:rPr lang="en-US" dirty="1" smtClean="0"/>
               <a:t>Fifth level</a:t>
             </a:r>
             <a:endParaRPr lang="en-US"/>
@@ -2736,9 +2601,7 @@
       <p:sp>
         <p:nvSpPr>
           <p:cNvPr id="4" name="Date Placeholder 3"/>
-          <p:cNvSpPr>
-            <a:spLocks noGrp="1"/>
-          </p:cNvSpPr>
+          <p:cNvSpPr/>
           <p:nvPr>
             <p:ph type="dt" sz="half" idx="2"/>
           </p:nvPr>
@@ -2748,9 +2611,7 @@
             <a:off x="457200" y="6356350"/>
             <a:ext cx="2133600" cy="365125"/>
           </a:xfrm>
-          <a:prstGeom prst="rect">
-            <a:avLst/>
-          </a:prstGeom>
+          <a:prstGeom prst="rect"/>
         </p:spPr>
         <p:txBody>
           <a:bodyPr vert="horz" lIns="91440" tIns="45720" rIns="91440" bIns="45720" rtlCol="0" anchor="ctr"/>
@@ -2768,6 +2629,7 @@
           <a:p>
             <a:fld id="{E8FD0B7A-F5DD-4F40-B4CB-3B2C354B893A}" type="datetimeFigureOut">
               <a:rPr lang="en-US" smtClean="0"/>
+              <a:t>3/4/2014</a:t>
             </a:fld>
             <a:endParaRPr lang="en-US"/>
           </a:p>
@@ -2776,9 +2638,7 @@
       <p:sp>
         <p:nvSpPr>
           <p:cNvPr id="5" name="Footer Placeholder 4"/>
-          <p:cNvSpPr>
-            <a:spLocks noGrp="1"/>
-          </p:cNvSpPr>
+          <p:cNvSpPr/>
           <p:nvPr>
             <p:ph type="ftr" sz="quarter" idx="3"/>
           </p:nvPr>
@@ -2788,9 +2648,7 @@
             <a:off x="3124200" y="6356350"/>
             <a:ext cx="2895600" cy="365125"/>
           </a:xfrm>
-          <a:prstGeom prst="rect">
-            <a:avLst/>
-          </a:prstGeom>
+          <a:prstGeom prst="rect"/>
         </p:spPr>
         <p:txBody>
           <a:bodyPr vert="horz" lIns="91440" tIns="45720" rIns="91440" bIns="45720" rtlCol="0" anchor="ctr"/>
@@ -2813,9 +2671,7 @@
       <p:sp>
         <p:nvSpPr>
           <p:cNvPr id="6" name="Slide Number Placeholder 5"/>
-          <p:cNvSpPr>
-            <a:spLocks noGrp="1"/>
-          </p:cNvSpPr>
+          <p:cNvSpPr/>
           <p:nvPr>
             <p:ph type="sldNum" sz="quarter" idx="4"/>
           </p:nvPr>
@@ -2825,9 +2681,7 @@
             <a:off x="6553200" y="6356350"/>
             <a:ext cx="2133600" cy="365125"/>
           </a:xfrm>
-          <a:prstGeom prst="rect">
-            <a:avLst/>
-          </a:prstGeom>
+          <a:prstGeom prst="rect"/>
         </p:spPr>
         <p:txBody>
           <a:bodyPr vert="horz" lIns="91440" tIns="45720" rIns="91440" bIns="45720" rtlCol="0" anchor="ctr"/>
@@ -2845,6 +2699,7 @@
           <a:p>
             <a:fld id="{93AE1883-0942-4AA3-9DB2-9C7C3A0314B1}" type="slidenum">
               <a:rPr lang="en-US" smtClean="0"/>
+              <a:t>‹#›</a:t>
             </a:fld>
             <a:endParaRPr lang="en-US"/>
           </a:p>
@@ -2866,11 +2721,11 @@
     <p:sldLayoutId id="2147483658" r:id="rId10"/>
     <p:sldLayoutId id="2147483659" r:id="rId11"/>
   </p:sldLayoutIdLst>
-  <p:transition/>
+  <p:transition spd="fast"/>
   <p:timing>
     <p:tnLst>
       <p:par>
-        <p:cTn id="1" dur="indefinite" restart="never" nodeType="tmRoot"/>
+        <p:cTn id="1" restart="never" nodeType="tmRoot"/>
       </p:par>
     </p:tnLst>
   </p:timing>
@@ -2896,7 +2751,7 @@
         <a:spcBef>
           <a:spcPct val="20000"/>
         </a:spcBef>
-        <a:buFont typeface="Arial" panose="020B0604020202020204" pitchFamily="34" charset="0"/>
+        <a:buFont typeface="Arial" pitchFamily="34" charset="0"/>
         <a:buChar char="•"/>
         <a:defRPr sz="3200" kern="1200">
           <a:solidFill>
@@ -2911,7 +2766,7 @@
         <a:spcBef>
           <a:spcPct val="20000"/>
         </a:spcBef>
-        <a:buFont typeface="Arial" panose="020B0604020202020204" pitchFamily="34" charset="0"/>
+        <a:buFont typeface="Arial" pitchFamily="34" charset="0"/>
         <a:buChar char="–"/>
         <a:defRPr sz="2800" kern="1200">
           <a:solidFill>
@@ -2926,7 +2781,7 @@
         <a:spcBef>
           <a:spcPct val="20000"/>
         </a:spcBef>
-        <a:buFont typeface="Arial" panose="020B0604020202020204" pitchFamily="34" charset="0"/>
+        <a:buFont typeface="Arial" pitchFamily="34" charset="0"/>
         <a:buChar char="•"/>
         <a:defRPr sz="2400" kern="1200">
           <a:solidFill>
@@ -2941,7 +2796,7 @@
         <a:spcBef>
           <a:spcPct val="20000"/>
         </a:spcBef>
-        <a:buFont typeface="Arial" panose="020B0604020202020204" pitchFamily="34" charset="0"/>
+        <a:buFont typeface="Arial" pitchFamily="34" charset="0"/>
         <a:buChar char="–"/>
         <a:defRPr sz="2000" kern="1200">
           <a:solidFill>
@@ -2956,7 +2811,7 @@
         <a:spcBef>
           <a:spcPct val="20000"/>
         </a:spcBef>
-        <a:buFont typeface="Arial" panose="020B0604020202020204" pitchFamily="34" charset="0"/>
+        <a:buFont typeface="Arial" pitchFamily="34" charset="0"/>
         <a:buChar char="»"/>
         <a:defRPr sz="2000" kern="1200">
           <a:solidFill>
@@ -2971,7 +2826,7 @@
         <a:spcBef>
           <a:spcPct val="20000"/>
         </a:spcBef>
-        <a:buFont typeface="Arial" panose="020B0604020202020204" pitchFamily="34" charset="0"/>
+        <a:buFont typeface="Arial" pitchFamily="34" charset="0"/>
         <a:buChar char="•"/>
         <a:defRPr sz="2000" kern="1200">
           <a:solidFill>
@@ -2986,7 +2841,7 @@
         <a:spcBef>
           <a:spcPct val="20000"/>
         </a:spcBef>
-        <a:buFont typeface="Arial" panose="020B0604020202020204" pitchFamily="34" charset="0"/>
+        <a:buFont typeface="Arial" pitchFamily="34" charset="0"/>
         <a:buChar char="•"/>
         <a:defRPr sz="2000" kern="1200">
           <a:solidFill>
@@ -3001,7 +2856,7 @@
         <a:spcBef>
           <a:spcPct val="20000"/>
         </a:spcBef>
-        <a:buFont typeface="Arial" panose="020B0604020202020204" pitchFamily="34" charset="0"/>
+        <a:buFont typeface="Arial" pitchFamily="34" charset="0"/>
         <a:buChar char="•"/>
         <a:defRPr sz="2000" kern="1200">
           <a:solidFill>
@@ -3016,7 +2871,7 @@
         <a:spcBef>
           <a:spcPct val="20000"/>
         </a:spcBef>
-        <a:buFont typeface="Arial" panose="020B0604020202020204" pitchFamily="34" charset="0"/>
+        <a:buFont typeface="Arial" pitchFamily="34" charset="0"/>
         <a:buChar char="•"/>
         <a:defRPr sz="2000" kern="1200">
           <a:solidFill>
@@ -3129,15 +2984,7 @@
 
 <file path=ppt/slides/slide1.xml><?xml version="1.0" encoding="utf-8"?>
 <p:sld xmlns:a="http://schemas.openxmlformats.org/drawingml/2006/main" xmlns:r="http://schemas.openxmlformats.org/officeDocument/2006/relationships" xmlns:p="http://schemas.openxmlformats.org/presentationml/2006/main">
-  <p:cSld>
-    <p:bg>
-      <p:bgPr>
-        <a:solidFill>
-          <a:schemeClr val="bg1"/>
-        </a:solidFill>
-        <a:effectLst/>
-      </p:bgPr>
-    </p:bg>
+  <p:cSld name="">
     <p:spTree>
       <p:nvGrpSpPr>
         <p:cNvPr id="1" name=""/>
@@ -3152,45 +2999,15 @@
           <a:chExt cx="0" cy="0"/>
         </a:xfrm>
       </p:grpSpPr>
-      <p:sp>
-        <p:nvSpPr>
-          <p:cNvPr id="2" name="Text Box 1"/>
-          <p:cNvSpPr txBox="1"/>
-          <p:nvPr/>
-        </p:nvSpPr>
-        <p:spPr>
-          <a:xfrm>
-            <a:off x="36830" y="93345"/>
-            <a:ext cx="9091295" cy="368300"/>
-          </a:xfrm>
-          <a:prstGeom prst="rect">
-            <a:avLst/>
-          </a:prstGeom>
-          <a:noFill/>
-        </p:spPr>
-        <p:txBody>
-          <a:bodyPr wrap="square" rtlCol="0">
-            <a:spAutoFit/>
-          </a:bodyPr>
-          <a:p>
-            <a:pPr algn="ctr"/>
-            <a:r>
-              <a:rPr lang="en-GB" altLang="en-US"/>
-              <a:t>Title</a:t>
-            </a:r>
-            <a:endParaRPr lang="en-GB" altLang="en-US"/>
-          </a:p>
-        </p:txBody>
-      </p:sp>
       <p:graphicFrame>
         <p:nvGraphicFramePr>
-          <p:cNvPr id="3" name="Table 2"/>
+          <p:cNvPr id="2" name="New Table"/>
           <p:cNvGraphicFramePr/>
           <p:nvPr/>
         </p:nvGraphicFramePr>
         <p:xfrm>
-          <a:off x="1371600" y="2667000"/>
-          <a:ext cx="6400165" cy="2636520"/>
+          <a:off x="1079500" y="1016000"/>
+          <a:ext cx="6985000" cy="4754880"/>
         </p:xfrm>
         <a:graphic>
           <a:graphicData uri="http://schemas.openxmlformats.org/drawingml/2006/table">
@@ -3199,186 +3016,748 @@
                 <a:tableStyleId>{5C22544A-7EE6-4342-B048-85BDC9FD1C3A}</a:tableStyleId>
               </a:tblPr>
               <a:tblGrid>
-                <a:gridCol w="3199765"/>
-                <a:gridCol w="3199765"/>
+                <a:gridCol w="1270000"/>
+                <a:gridCol w="1270000"/>
+                <a:gridCol w="1905000"/>
+                <a:gridCol w="1270000"/>
+                <a:gridCol w="1270000"/>
               </a:tblGrid>
-              <a:tr h="381000">
-                <a:tc>
-                  <a:txBody>
-                    <a:bodyPr/>
-                    <a:p>
-                      <a:pPr>
-                        <a:buNone/>
-                      </a:pPr>
-                      <a:endParaRPr lang="en-US"/>
-                    </a:p>
-                  </a:txBody>
-                  <a:tcPr/>
-                </a:tc>
-                <a:tc>
-                  <a:txBody>
-                    <a:bodyPr/>
-                    <a:p>
-                      <a:pPr>
-                        <a:buNone/>
-                      </a:pPr>
-                      <a:endParaRPr lang="en-US"/>
+              <a:tr h="190500">
+                <a:tc>
+                  <a:txBody>
+                    <a:bodyPr anchorCtr="0"/>
+                    <a:lstStyle/>
+                    <a:p>
+                      <a:pPr algn="l"/>
+                      <a:endParaRPr/>
+                    </a:p>
+                  </a:txBody>
+                  <a:tcPr/>
+                </a:tc>
+                <a:tc>
+                  <a:txBody>
+                    <a:bodyPr anchorCtr="0"/>
+                    <a:lstStyle/>
+                    <a:p>
+                      <a:pPr algn="l"/>
+                      <a:endParaRPr/>
+                    </a:p>
+                  </a:txBody>
+                  <a:tcPr/>
+                </a:tc>
+                <a:tc>
+                  <a:txBody>
+                    <a:bodyPr anchorCtr="0"/>
+                    <a:lstStyle/>
+                    <a:p>
+                      <a:pPr algn="l"/>
+                      <a:endParaRPr/>
+                    </a:p>
+                  </a:txBody>
+                  <a:tcPr/>
+                </a:tc>
+                <a:tc>
+                  <a:txBody>
+                    <a:bodyPr anchorCtr="0"/>
+                    <a:lstStyle/>
+                    <a:p>
+                      <a:pPr algn="l"/>
+                      <a:endParaRPr/>
+                    </a:p>
+                  </a:txBody>
+                  <a:tcPr/>
+                </a:tc>
+                <a:tc>
+                  <a:txBody>
+                    <a:bodyPr anchorCtr="0"/>
+                    <a:lstStyle/>
+                    <a:p>
+                      <a:pPr algn="l"/>
+                      <a:endParaRPr/>
                     </a:p>
                   </a:txBody>
                   <a:tcPr/>
                 </a:tc>
               </a:tr>
-              <a:tr h="381000">
-                <a:tc>
-                  <a:txBody>
-                    <a:bodyPr/>
-                    <a:p>
-                      <a:pPr>
-                        <a:buNone/>
-                      </a:pPr>
-                      <a:endParaRPr lang="en-US"/>
-                    </a:p>
-                  </a:txBody>
-                  <a:tcPr/>
-                </a:tc>
-                <a:tc>
-                  <a:txBody>
-                    <a:bodyPr/>
-                    <a:p>
-                      <a:pPr>
-                        <a:buNone/>
-                      </a:pPr>
-                      <a:endParaRPr lang="en-US" dirty="0"/>
+              <a:tr h="190500">
+                <a:tc>
+                  <a:txBody>
+                    <a:bodyPr anchorCtr="0"/>
+                    <a:lstStyle/>
+                    <a:p>
+                      <a:pPr algn="l"/>
+                      <a:endParaRPr/>
+                    </a:p>
+                  </a:txBody>
+                  <a:tcPr/>
+                </a:tc>
+                <a:tc>
+                  <a:txBody>
+                    <a:bodyPr anchorCtr="0"/>
+                    <a:lstStyle/>
+                    <a:p>
+                      <a:pPr algn="l"/>
+                      <a:endParaRPr/>
+                    </a:p>
+                  </a:txBody>
+                  <a:tcPr/>
+                </a:tc>
+                <a:tc>
+                  <a:txBody>
+                    <a:bodyPr anchorCtr="0"/>
+                    <a:lstStyle/>
+                    <a:p>
+                      <a:pPr algn="l"/>
+                      <a:endParaRPr/>
+                    </a:p>
+                  </a:txBody>
+                  <a:tcPr/>
+                </a:tc>
+                <a:tc>
+                  <a:txBody>
+                    <a:bodyPr anchorCtr="0"/>
+                    <a:lstStyle/>
+                    <a:p>
+                      <a:pPr algn="l"/>
+                      <a:endParaRPr/>
+                    </a:p>
+                  </a:txBody>
+                  <a:tcPr/>
+                </a:tc>
+                <a:tc>
+                  <a:txBody>
+                    <a:bodyPr anchorCtr="0"/>
+                    <a:lstStyle/>
+                    <a:p>
+                      <a:pPr algn="l"/>
+                      <a:endParaRPr/>
                     </a:p>
                   </a:txBody>
                   <a:tcPr/>
                 </a:tc>
               </a:tr>
-              <a:tr h="381000">
-                <a:tc>
-                  <a:txBody>
-                    <a:bodyPr/>
-                    <a:p>
-                      <a:pPr>
-                        <a:buNone/>
-                      </a:pPr>
-                      <a:endParaRPr lang="en-US"/>
-                    </a:p>
-                  </a:txBody>
-                  <a:tcPr/>
-                </a:tc>
-                <a:tc>
-                  <a:txBody>
-                    <a:bodyPr/>
-                    <a:p>
-                      <a:pPr>
-                        <a:buNone/>
-                      </a:pPr>
-                      <a:endParaRPr lang="en-US"/>
+              <a:tr h="190500">
+                <a:tc>
+                  <a:txBody>
+                    <a:bodyPr anchorCtr="0"/>
+                    <a:lstStyle/>
+                    <a:p>
+                      <a:pPr algn="l"/>
+                      <a:endParaRPr/>
+                    </a:p>
+                  </a:txBody>
+                  <a:tcPr/>
+                </a:tc>
+                <a:tc>
+                  <a:txBody>
+                    <a:bodyPr anchorCtr="0"/>
+                    <a:lstStyle/>
+                    <a:p>
+                      <a:pPr algn="l"/>
+                      <a:endParaRPr/>
+                    </a:p>
+                  </a:txBody>
+                  <a:tcPr/>
+                </a:tc>
+                <a:tc>
+                  <a:txBody>
+                    <a:bodyPr anchorCtr="0"/>
+                    <a:lstStyle/>
+                    <a:p>
+                      <a:pPr algn="l"/>
+                      <a:endParaRPr/>
+                    </a:p>
+                  </a:txBody>
+                  <a:tcPr/>
+                </a:tc>
+                <a:tc>
+                  <a:txBody>
+                    <a:bodyPr anchorCtr="0"/>
+                    <a:lstStyle/>
+                    <a:p>
+                      <a:pPr algn="l"/>
+                      <a:endParaRPr/>
+                    </a:p>
+                  </a:txBody>
+                  <a:tcPr/>
+                </a:tc>
+                <a:tc>
+                  <a:txBody>
+                    <a:bodyPr anchorCtr="0"/>
+                    <a:lstStyle/>
+                    <a:p>
+                      <a:pPr algn="l"/>
+                      <a:endParaRPr/>
                     </a:p>
                   </a:txBody>
                   <a:tcPr/>
                 </a:tc>
               </a:tr>
-              <a:tr h="381000">
-                <a:tc>
-                  <a:txBody>
-                    <a:bodyPr/>
-                    <a:p>
-                      <a:pPr>
-                        <a:buNone/>
-                      </a:pPr>
-                      <a:endParaRPr lang="en-US"/>
-                    </a:p>
-                  </a:txBody>
-                  <a:tcPr/>
-                </a:tc>
-                <a:tc>
-                  <a:txBody>
-                    <a:bodyPr/>
-                    <a:p>
-                      <a:pPr>
-                        <a:buNone/>
-                      </a:pPr>
-                      <a:endParaRPr lang="en-US"/>
+              <a:tr h="190500">
+                <a:tc>
+                  <a:txBody>
+                    <a:bodyPr anchorCtr="0"/>
+                    <a:lstStyle/>
+                    <a:p>
+                      <a:pPr algn="l"/>
+                      <a:endParaRPr/>
+                    </a:p>
+                  </a:txBody>
+                  <a:tcPr/>
+                </a:tc>
+                <a:tc>
+                  <a:txBody>
+                    <a:bodyPr anchorCtr="0"/>
+                    <a:lstStyle/>
+                    <a:p>
+                      <a:pPr algn="l"/>
+                      <a:endParaRPr/>
+                    </a:p>
+                  </a:txBody>
+                  <a:tcPr/>
+                </a:tc>
+                <a:tc>
+                  <a:txBody>
+                    <a:bodyPr anchorCtr="0"/>
+                    <a:lstStyle/>
+                    <a:p>
+                      <a:pPr algn="l"/>
+                      <a:endParaRPr/>
+                    </a:p>
+                  </a:txBody>
+                  <a:tcPr/>
+                </a:tc>
+                <a:tc>
+                  <a:txBody>
+                    <a:bodyPr anchorCtr="0"/>
+                    <a:lstStyle/>
+                    <a:p>
+                      <a:pPr algn="l"/>
+                      <a:endParaRPr/>
+                    </a:p>
+                  </a:txBody>
+                  <a:tcPr/>
+                </a:tc>
+                <a:tc>
+                  <a:txBody>
+                    <a:bodyPr anchorCtr="0"/>
+                    <a:lstStyle/>
+                    <a:p>
+                      <a:pPr algn="l"/>
+                      <a:endParaRPr/>
                     </a:p>
                   </a:txBody>
                   <a:tcPr/>
                 </a:tc>
               </a:tr>
-              <a:tr h="370840">
-                <a:tc>
-                  <a:txBody>
-                    <a:bodyPr/>
-                    <a:p>
-                      <a:pPr>
-                        <a:buNone/>
-                      </a:pPr>
-                      <a:endParaRPr lang="en-US"/>
-                    </a:p>
-                  </a:txBody>
-                  <a:tcPr/>
-                </a:tc>
-                <a:tc>
-                  <a:txBody>
-                    <a:bodyPr/>
-                    <a:p>
-                      <a:pPr>
-                        <a:buNone/>
-                      </a:pPr>
-                      <a:endParaRPr lang="en-US"/>
+              <a:tr h="190500">
+                <a:tc>
+                  <a:txBody>
+                    <a:bodyPr anchorCtr="0"/>
+                    <a:lstStyle/>
+                    <a:p>
+                      <a:pPr algn="l"/>
+                      <a:endParaRPr/>
+                    </a:p>
+                  </a:txBody>
+                  <a:tcPr/>
+                </a:tc>
+                <a:tc>
+                  <a:txBody>
+                    <a:bodyPr anchorCtr="0"/>
+                    <a:lstStyle/>
+                    <a:p>
+                      <a:pPr algn="l"/>
+                      <a:endParaRPr/>
+                    </a:p>
+                  </a:txBody>
+                  <a:tcPr/>
+                </a:tc>
+                <a:tc>
+                  <a:txBody>
+                    <a:bodyPr anchorCtr="0"/>
+                    <a:lstStyle/>
+                    <a:p>
+                      <a:pPr algn="l"/>
+                      <a:endParaRPr/>
+                    </a:p>
+                  </a:txBody>
+                  <a:tcPr/>
+                </a:tc>
+                <a:tc>
+                  <a:txBody>
+                    <a:bodyPr anchorCtr="0"/>
+                    <a:lstStyle/>
+                    <a:p>
+                      <a:pPr algn="l"/>
+                      <a:endParaRPr/>
+                    </a:p>
+                  </a:txBody>
+                  <a:tcPr/>
+                </a:tc>
+                <a:tc>
+                  <a:txBody>
+                    <a:bodyPr anchorCtr="0"/>
+                    <a:lstStyle/>
+                    <a:p>
+                      <a:pPr algn="l"/>
+                      <a:endParaRPr/>
                     </a:p>
                   </a:txBody>
                   <a:tcPr/>
                 </a:tc>
               </a:tr>
-              <a:tr h="370840">
-                <a:tc>
-                  <a:txBody>
-                    <a:bodyPr/>
-                    <a:p>
-                      <a:pPr>
-                        <a:buNone/>
-                      </a:pPr>
-                      <a:endParaRPr lang="en-US"/>
-                    </a:p>
-                  </a:txBody>
-                  <a:tcPr/>
-                </a:tc>
-                <a:tc>
-                  <a:txBody>
-                    <a:bodyPr/>
-                    <a:p>
-                      <a:pPr>
-                        <a:buNone/>
-                      </a:pPr>
-                      <a:endParaRPr lang="en-US"/>
+              <a:tr h="190500">
+                <a:tc>
+                  <a:txBody>
+                    <a:bodyPr anchorCtr="0"/>
+                    <a:lstStyle/>
+                    <a:p>
+                      <a:pPr algn="l"/>
+                      <a:endParaRPr/>
+                    </a:p>
+                  </a:txBody>
+                  <a:tcPr/>
+                </a:tc>
+                <a:tc>
+                  <a:txBody>
+                    <a:bodyPr anchorCtr="0"/>
+                    <a:lstStyle/>
+                    <a:p>
+                      <a:pPr algn="l"/>
+                      <a:endParaRPr/>
+                    </a:p>
+                  </a:txBody>
+                  <a:tcPr/>
+                </a:tc>
+                <a:tc>
+                  <a:txBody>
+                    <a:bodyPr anchorCtr="0"/>
+                    <a:lstStyle/>
+                    <a:p>
+                      <a:pPr algn="l"/>
+                      <a:endParaRPr/>
+                    </a:p>
+                  </a:txBody>
+                  <a:tcPr/>
+                </a:tc>
+                <a:tc>
+                  <a:txBody>
+                    <a:bodyPr anchorCtr="0"/>
+                    <a:lstStyle/>
+                    <a:p>
+                      <a:pPr algn="l"/>
+                      <a:endParaRPr/>
+                    </a:p>
+                  </a:txBody>
+                  <a:tcPr/>
+                </a:tc>
+                <a:tc>
+                  <a:txBody>
+                    <a:bodyPr anchorCtr="0"/>
+                    <a:lstStyle/>
+                    <a:p>
+                      <a:pPr algn="l"/>
+                      <a:endParaRPr/>
                     </a:p>
                   </a:txBody>
                   <a:tcPr/>
                 </a:tc>
               </a:tr>
-              <a:tr h="370840">
-                <a:tc>
-                  <a:txBody>
-                    <a:bodyPr/>
-                    <a:p>
-                      <a:pPr>
-                        <a:buNone/>
-                      </a:pPr>
-                      <a:endParaRPr lang="en-US"/>
-                    </a:p>
-                  </a:txBody>
-                  <a:tcPr/>
-                </a:tc>
-                <a:tc>
-                  <a:txBody>
-                    <a:bodyPr/>
-                    <a:p>
-                      <a:pPr>
-                        <a:buNone/>
-                      </a:pPr>
-                      <a:endParaRPr lang="en-US"/>
+              <a:tr h="190500">
+                <a:tc>
+                  <a:txBody>
+                    <a:bodyPr anchorCtr="0"/>
+                    <a:lstStyle/>
+                    <a:p>
+                      <a:pPr algn="l"/>
+                      <a:endParaRPr/>
+                    </a:p>
+                  </a:txBody>
+                  <a:tcPr/>
+                </a:tc>
+                <a:tc>
+                  <a:txBody>
+                    <a:bodyPr anchorCtr="0"/>
+                    <a:lstStyle/>
+                    <a:p>
+                      <a:pPr algn="l"/>
+                      <a:endParaRPr/>
+                    </a:p>
+                  </a:txBody>
+                  <a:tcPr/>
+                </a:tc>
+                <a:tc>
+                  <a:txBody>
+                    <a:bodyPr anchorCtr="0"/>
+                    <a:lstStyle/>
+                    <a:p>
+                      <a:pPr algn="l"/>
+                      <a:endParaRPr/>
+                    </a:p>
+                  </a:txBody>
+                  <a:tcPr/>
+                </a:tc>
+                <a:tc>
+                  <a:txBody>
+                    <a:bodyPr anchorCtr="0"/>
+                    <a:lstStyle/>
+                    <a:p>
+                      <a:pPr algn="l"/>
+                      <a:endParaRPr/>
+                    </a:p>
+                  </a:txBody>
+                  <a:tcPr/>
+                </a:tc>
+                <a:tc>
+                  <a:txBody>
+                    <a:bodyPr anchorCtr="0"/>
+                    <a:lstStyle/>
+                    <a:p>
+                      <a:pPr algn="l"/>
+                      <a:endParaRPr/>
+                    </a:p>
+                  </a:txBody>
+                  <a:tcPr/>
+                </a:tc>
+              </a:tr>
+              <a:tr h="190500">
+                <a:tc>
+                  <a:txBody>
+                    <a:bodyPr anchorCtr="0"/>
+                    <a:lstStyle/>
+                    <a:p>
+                      <a:pPr algn="l"/>
+                      <a:endParaRPr/>
+                    </a:p>
+                  </a:txBody>
+                  <a:tcPr/>
+                </a:tc>
+                <a:tc>
+                  <a:txBody>
+                    <a:bodyPr anchorCtr="0"/>
+                    <a:lstStyle/>
+                    <a:p>
+                      <a:pPr algn="l"/>
+                      <a:endParaRPr/>
+                    </a:p>
+                  </a:txBody>
+                  <a:tcPr/>
+                </a:tc>
+                <a:tc>
+                  <a:txBody>
+                    <a:bodyPr anchorCtr="0"/>
+                    <a:lstStyle/>
+                    <a:p>
+                      <a:pPr algn="l"/>
+                      <a:endParaRPr/>
+                    </a:p>
+                  </a:txBody>
+                  <a:tcPr/>
+                </a:tc>
+                <a:tc>
+                  <a:txBody>
+                    <a:bodyPr anchorCtr="0"/>
+                    <a:lstStyle/>
+                    <a:p>
+                      <a:pPr algn="l"/>
+                      <a:endParaRPr/>
+                    </a:p>
+                  </a:txBody>
+                  <a:tcPr/>
+                </a:tc>
+                <a:tc>
+                  <a:txBody>
+                    <a:bodyPr anchorCtr="0"/>
+                    <a:lstStyle/>
+                    <a:p>
+                      <a:pPr algn="l"/>
+                      <a:endParaRPr/>
+                    </a:p>
+                  </a:txBody>
+                  <a:tcPr/>
+                </a:tc>
+              </a:tr>
+              <a:tr h="190500">
+                <a:tc>
+                  <a:txBody>
+                    <a:bodyPr anchorCtr="0"/>
+                    <a:lstStyle/>
+                    <a:p>
+                      <a:pPr algn="l"/>
+                      <a:endParaRPr/>
+                    </a:p>
+                  </a:txBody>
+                  <a:tcPr/>
+                </a:tc>
+                <a:tc>
+                  <a:txBody>
+                    <a:bodyPr anchorCtr="0"/>
+                    <a:lstStyle/>
+                    <a:p>
+                      <a:pPr algn="l"/>
+                      <a:endParaRPr/>
+                    </a:p>
+                  </a:txBody>
+                  <a:tcPr/>
+                </a:tc>
+                <a:tc>
+                  <a:txBody>
+                    <a:bodyPr anchorCtr="0"/>
+                    <a:lstStyle/>
+                    <a:p>
+                      <a:pPr algn="l"/>
+                      <a:endParaRPr/>
+                    </a:p>
+                  </a:txBody>
+                  <a:tcPr/>
+                </a:tc>
+                <a:tc>
+                  <a:txBody>
+                    <a:bodyPr anchorCtr="0"/>
+                    <a:lstStyle/>
+                    <a:p>
+                      <a:pPr algn="l"/>
+                      <a:endParaRPr/>
+                    </a:p>
+                  </a:txBody>
+                  <a:tcPr/>
+                </a:tc>
+                <a:tc>
+                  <a:txBody>
+                    <a:bodyPr anchorCtr="0"/>
+                    <a:lstStyle/>
+                    <a:p>
+                      <a:pPr algn="l"/>
+                      <a:endParaRPr/>
+                    </a:p>
+                  </a:txBody>
+                  <a:tcPr/>
+                </a:tc>
+              </a:tr>
+              <a:tr h="190500">
+                <a:tc>
+                  <a:txBody>
+                    <a:bodyPr anchorCtr="0"/>
+                    <a:lstStyle/>
+                    <a:p>
+                      <a:pPr algn="l"/>
+                      <a:endParaRPr/>
+                    </a:p>
+                  </a:txBody>
+                  <a:tcPr/>
+                </a:tc>
+                <a:tc>
+                  <a:txBody>
+                    <a:bodyPr anchorCtr="0"/>
+                    <a:lstStyle/>
+                    <a:p>
+                      <a:pPr algn="l"/>
+                      <a:endParaRPr/>
+                    </a:p>
+                  </a:txBody>
+                  <a:tcPr/>
+                </a:tc>
+                <a:tc>
+                  <a:txBody>
+                    <a:bodyPr anchorCtr="0"/>
+                    <a:lstStyle/>
+                    <a:p>
+                      <a:pPr algn="l"/>
+                      <a:endParaRPr/>
+                    </a:p>
+                  </a:txBody>
+                  <a:tcPr/>
+                </a:tc>
+                <a:tc>
+                  <a:txBody>
+                    <a:bodyPr anchorCtr="0"/>
+                    <a:lstStyle/>
+                    <a:p>
+                      <a:pPr algn="l"/>
+                      <a:endParaRPr/>
+                    </a:p>
+                  </a:txBody>
+                  <a:tcPr/>
+                </a:tc>
+                <a:tc>
+                  <a:txBody>
+                    <a:bodyPr anchorCtr="0"/>
+                    <a:lstStyle/>
+                    <a:p>
+                      <a:pPr algn="l"/>
+                      <a:endParaRPr/>
+                    </a:p>
+                  </a:txBody>
+                  <a:tcPr/>
+                </a:tc>
+              </a:tr>
+              <a:tr h="190500">
+                <a:tc>
+                  <a:txBody>
+                    <a:bodyPr anchorCtr="0"/>
+                    <a:lstStyle/>
+                    <a:p>
+                      <a:pPr algn="l"/>
+                      <a:endParaRPr/>
+                    </a:p>
+                  </a:txBody>
+                  <a:tcPr/>
+                </a:tc>
+                <a:tc>
+                  <a:txBody>
+                    <a:bodyPr anchorCtr="0"/>
+                    <a:lstStyle/>
+                    <a:p>
+                      <a:pPr algn="l"/>
+                      <a:endParaRPr/>
+                    </a:p>
+                  </a:txBody>
+                  <a:tcPr/>
+                </a:tc>
+                <a:tc>
+                  <a:txBody>
+                    <a:bodyPr anchorCtr="0"/>
+                    <a:lstStyle/>
+                    <a:p>
+                      <a:pPr algn="l"/>
+                      <a:endParaRPr/>
+                    </a:p>
+                  </a:txBody>
+                  <a:tcPr/>
+                </a:tc>
+                <a:tc>
+                  <a:txBody>
+                    <a:bodyPr anchorCtr="0"/>
+                    <a:lstStyle/>
+                    <a:p>
+                      <a:pPr algn="l"/>
+                      <a:endParaRPr/>
+                    </a:p>
+                  </a:txBody>
+                  <a:tcPr/>
+                </a:tc>
+                <a:tc>
+                  <a:txBody>
+                    <a:bodyPr anchorCtr="0"/>
+                    <a:lstStyle/>
+                    <a:p>
+                      <a:pPr algn="l"/>
+                      <a:endParaRPr/>
+                    </a:p>
+                  </a:txBody>
+                  <a:tcPr/>
+                </a:tc>
+              </a:tr>
+              <a:tr h="190500">
+                <a:tc>
+                  <a:txBody>
+                    <a:bodyPr anchorCtr="0"/>
+                    <a:lstStyle/>
+                    <a:p>
+                      <a:pPr algn="l"/>
+                      <a:endParaRPr/>
+                    </a:p>
+                  </a:txBody>
+                  <a:tcPr/>
+                </a:tc>
+                <a:tc>
+                  <a:txBody>
+                    <a:bodyPr anchorCtr="0"/>
+                    <a:lstStyle/>
+                    <a:p>
+                      <a:pPr algn="l"/>
+                      <a:endParaRPr/>
+                    </a:p>
+                  </a:txBody>
+                  <a:tcPr/>
+                </a:tc>
+                <a:tc>
+                  <a:txBody>
+                    <a:bodyPr anchorCtr="0"/>
+                    <a:lstStyle/>
+                    <a:p>
+                      <a:pPr algn="l"/>
+                      <a:endParaRPr/>
+                    </a:p>
+                  </a:txBody>
+                  <a:tcPr/>
+                </a:tc>
+                <a:tc>
+                  <a:txBody>
+                    <a:bodyPr anchorCtr="0"/>
+                    <a:lstStyle/>
+                    <a:p>
+                      <a:pPr algn="l"/>
+                      <a:endParaRPr/>
+                    </a:p>
+                  </a:txBody>
+                  <a:tcPr/>
+                </a:tc>
+                <a:tc>
+                  <a:txBody>
+                    <a:bodyPr anchorCtr="0"/>
+                    <a:lstStyle/>
+                    <a:p>
+                      <a:pPr algn="l"/>
+                      <a:endParaRPr/>
+                    </a:p>
+                  </a:txBody>
+                  <a:tcPr/>
+                </a:tc>
+              </a:tr>
+              <a:tr h="190500">
+                <a:tc>
+                  <a:txBody>
+                    <a:bodyPr anchorCtr="0"/>
+                    <a:lstStyle/>
+                    <a:p>
+                      <a:pPr algn="l"/>
+                      <a:endParaRPr/>
+                    </a:p>
+                  </a:txBody>
+                  <a:tcPr/>
+                </a:tc>
+                <a:tc>
+                  <a:txBody>
+                    <a:bodyPr anchorCtr="0"/>
+                    <a:lstStyle/>
+                    <a:p>
+                      <a:pPr algn="l"/>
+                      <a:endParaRPr/>
+                    </a:p>
+                  </a:txBody>
+                  <a:tcPr/>
+                </a:tc>
+                <a:tc>
+                  <a:txBody>
+                    <a:bodyPr anchorCtr="0"/>
+                    <a:lstStyle/>
+                    <a:p>
+                      <a:pPr algn="l"/>
+                      <a:endParaRPr/>
+                    </a:p>
+                  </a:txBody>
+                  <a:tcPr/>
+                </a:tc>
+                <a:tc>
+                  <a:txBody>
+                    <a:bodyPr anchorCtr="0"/>
+                    <a:lstStyle/>
+                    <a:p>
+                      <a:pPr algn="l"/>
+                      <a:endParaRPr/>
+                    </a:p>
+                  </a:txBody>
+                  <a:tcPr/>
+                </a:tc>
+                <a:tc>
+                  <a:txBody>
+                    <a:bodyPr anchorCtr="0"/>
+                    <a:lstStyle/>
+                    <a:p>
+                      <a:pPr algn="l"/>
+                      <a:endParaRPr/>
                     </a:p>
                   </a:txBody>
                   <a:tcPr/>
@@ -3393,15 +3772,25 @@
   <p:clrMapOvr>
     <a:masterClrMapping/>
   </p:clrMapOvr>
-  <p:transition/>
+  <p:transition spd="fast"/>
   <p:timing>
     <p:tnLst>
       <p:par>
-        <p:cTn id="1" dur="indefinite" restart="never" nodeType="tmRoot"/>
+        <p:cTn id="1" restart="never" nodeType="tmRoot"/>
       </p:par>
     </p:tnLst>
   </p:timing>
 </p:sld>
+</file>
+
+<file path=ppt/tags/tag1.xml><?xml version="1.0" encoding="utf-8"?>
+<p:tagLst xmlns:p="http://schemas.openxmlformats.org/presentationml/2006/main">
+  <p:tag name="AS_NET" val="4.0.30319.42000"/>
+  <p:tag name="AS_OS" val="Microsoft Windows NT 6.2.9200.0"/>
+  <p:tag name="AS_RELEASE_DATE" val="2013.12.17"/>
+  <p:tag name="AS_TITLE" val="Spire.Presentation for .NET "/>
+  <p:tag name="AS_VERSION" val="2.1.0.0"/>
+</p:tagLst>
 </file>
 
 <file path=ppt/theme/theme1.xml><?xml version="1.0" encoding="utf-8"?>
@@ -3450,71 +3839,71 @@
         <a:latin typeface="Calibri"/>
         <a:ea typeface=""/>
         <a:cs typeface=""/>
-        <a:font script="Jpan" typeface="ＭＳ%20Ｐゴシック"/>
-        <a:font script="Hang" typeface="맑은%20고딕"/>
+        <a:font script="Ethi" typeface="Nyala"/>
+        <a:font script="Thaa" typeface="MV Boli"/>
+        <a:font script="Laoo" typeface="DokChampa"/>
+        <a:font script="Guru" typeface="Raavi"/>
+        <a:font script="Jpan" typeface="ＭＳ Ｐゴシック"/>
+        <a:font script="Hant" typeface="新細明體"/>
+        <a:font script="Tibt" typeface="Microsoft Himalaya"/>
+        <a:font script="Telu" typeface="Gautami"/>
+        <a:font script="Hebr" typeface="Times New Roman"/>
+        <a:font script="Hang" typeface="맑은 고딕"/>
+        <a:font script="Sinh" typeface="Iskoola Pota"/>
+        <a:font script="Yiii" typeface="Microsoft Yi Baiti"/>
+        <a:font script="Khmr" typeface="MoolBoran"/>
+        <a:font script="Thai" typeface="Angsana New"/>
+        <a:font script="Viet" typeface="Times New Roman"/>
+        <a:font script="Mlym" typeface="Kartika"/>
+        <a:font script="Taml" typeface="Latha"/>
+        <a:font script="Uigh" typeface="Microsoft Uighur"/>
+        <a:font script="Knda" typeface="Tunga"/>
+        <a:font script="Gujr" typeface="Shruti"/>
+        <a:font script="Arab" typeface="Times New Roman"/>
+        <a:font script="Beng" typeface="Vrinda"/>
         <a:font script="Hans" typeface="宋体"/>
-        <a:font script="Hant" typeface="新細明體"/>
-        <a:font script="Arab" typeface="Times New Roman"/>
-        <a:font script="Hebr" typeface="Times New Roman"/>
-        <a:font script="Thai" typeface="Angsana New"/>
-        <a:font script="Ethi" typeface="Nyala"/>
-        <a:font script="Beng" typeface="Vrinda"/>
-        <a:font script="Gujr" typeface="Shruti"/>
-        <a:font script="Khmr" typeface="MoolBoran"/>
-        <a:font script="Knda" typeface="Tunga"/>
-        <a:font script="Guru" typeface="Raavi"/>
+        <a:font script="Orya" typeface="Kalinga"/>
         <a:font script="Cans" typeface="Euphemia"/>
         <a:font script="Cher" typeface="Plantagenet Cherokee"/>
-        <a:font script="Yiii" typeface="Microsoft Yi Baiti"/>
-        <a:font script="Tibt" typeface="Microsoft Himalaya"/>
-        <a:font script="Thaa" typeface="MV Boli"/>
+        <a:font script="Mong" typeface="Mongolian Baiti"/>
+        <a:font script="Syrc" typeface="Estrangelo Edessa"/>
+        <a:font script="Geor" typeface="Sylfaen"/>
         <a:font script="Deva" typeface="Mangal"/>
-        <a:font script="Telu" typeface="Gautami"/>
-        <a:font script="Taml" typeface="Latha"/>
-        <a:font script="Syrc" typeface="Estrangelo Edessa"/>
-        <a:font script="Orya" typeface="Kalinga"/>
-        <a:font script="Mlym" typeface="Kartika"/>
-        <a:font script="Laoo" typeface="DokChampa"/>
-        <a:font script="Sinh" typeface="Iskoola Pota"/>
-        <a:font script="Mong" typeface="Mongolian Baiti"/>
-        <a:font script="Viet" typeface="Times New Roman"/>
-        <a:font script="Uigh" typeface="Microsoft Uighur"/>
-        <a:font script="Geor" typeface="Sylfaen"/>
       </a:majorFont>
       <a:minorFont>
         <a:latin typeface="Calibri"/>
         <a:ea typeface=""/>
         <a:cs typeface=""/>
-        <a:font script="Jpan" typeface="ＭＳ%20Ｐゴシック"/>
-        <a:font script="Hang" typeface="맑은%20고딕"/>
+        <a:font script="Ethi" typeface="Nyala"/>
+        <a:font script="Thaa" typeface="MV Boli"/>
+        <a:font script="Laoo" typeface="DokChampa"/>
+        <a:font script="Guru" typeface="Raavi"/>
+        <a:font script="Jpan" typeface="ＭＳ Ｐゴシック"/>
+        <a:font script="Hant" typeface="新細明體"/>
+        <a:font script="Tibt" typeface="Microsoft Himalaya"/>
+        <a:font script="Telu" typeface="Gautami"/>
+        <a:font script="Hebr" typeface="Arial"/>
+        <a:font script="Hang" typeface="맑은 고딕"/>
+        <a:font script="Sinh" typeface="Iskoola Pota"/>
+        <a:font script="Yiii" typeface="Microsoft Yi Baiti"/>
+        <a:font script="Khmr" typeface="DaunPenh"/>
+        <a:font script="Thai" typeface="Cordia New"/>
+        <a:font script="Viet" typeface="Arial"/>
+        <a:font script="Mlym" typeface="Kartika"/>
+        <a:font script="Taml" typeface="Latha"/>
+        <a:font script="Uigh" typeface="Microsoft Uighur"/>
+        <a:font script="Knda" typeface="Tunga"/>
+        <a:font script="Gujr" typeface="Shruti"/>
+        <a:font script="Arab" typeface="Arial"/>
+        <a:font script="Beng" typeface="Vrinda"/>
         <a:font script="Hans" typeface="宋体"/>
-        <a:font script="Hant" typeface="新細明體"/>
-        <a:font script="Arab" typeface="Arial"/>
-        <a:font script="Hebr" typeface="Arial"/>
-        <a:font script="Thai" typeface="Cordia New"/>
-        <a:font script="Ethi" typeface="Nyala"/>
-        <a:font script="Beng" typeface="Vrinda"/>
-        <a:font script="Gujr" typeface="Shruti"/>
-        <a:font script="Khmr" typeface="DaunPenh"/>
-        <a:font script="Knda" typeface="Tunga"/>
-        <a:font script="Guru" typeface="Raavi"/>
+        <a:font script="Orya" typeface="Kalinga"/>
         <a:font script="Cans" typeface="Euphemia"/>
         <a:font script="Cher" typeface="Plantagenet Cherokee"/>
-        <a:font script="Yiii" typeface="Microsoft Yi Baiti"/>
-        <a:font script="Tibt" typeface="Microsoft Himalaya"/>
-        <a:font script="Thaa" typeface="MV Boli"/>
+        <a:font script="Mong" typeface="Mongolian Baiti"/>
+        <a:font script="Syrc" typeface="Estrangelo Edessa"/>
+        <a:font script="Geor" typeface="Sylfaen"/>
         <a:font script="Deva" typeface="Mangal"/>
-        <a:font script="Telu" typeface="Gautami"/>
-        <a:font script="Taml" typeface="Latha"/>
-        <a:font script="Syrc" typeface="Estrangelo Edessa"/>
-        <a:font script="Orya" typeface="Kalinga"/>
-        <a:font script="Mlym" typeface="Kartika"/>
-        <a:font script="Laoo" typeface="DokChampa"/>
-        <a:font script="Sinh" typeface="Iskoola Pota"/>
-        <a:font script="Mong" typeface="Mongolian Baiti"/>
-        <a:font script="Viet" typeface="Arial"/>
-        <a:font script="Uigh" typeface="Microsoft Uighur"/>
-        <a:font script="Geor" typeface="Sylfaen"/>
       </a:minorFont>
     </a:fontScheme>
     <a:fmtScheme name="Office">
@@ -3544,6 +3933,7 @@
             </a:gs>
           </a:gsLst>
           <a:lin ang="16200000" scaled="1"/>
+          <a:tileRect/>
         </a:gradFill>
         <a:gradFill rotWithShape="1">
           <a:gsLst>
@@ -3567,6 +3957,7 @@
             </a:gs>
           </a:gsLst>
           <a:lin ang="16200000" scaled="0"/>
+          <a:tileRect/>
         </a:gradFill>
       </a:fillStyleLst>
       <a:lnStyleLst>
@@ -3595,7 +3986,7 @@
       <a:effectStyleLst>
         <a:effectStyle>
           <a:effectLst>
-            <a:outerShdw blurRad="40000" dist="20000" dir="5400000" rotWithShape="0">
+            <a:outerShdw blurRad="40000" dir="5400000" dist="20000" rotWithShape="0">
               <a:srgbClr val="000000">
                 <a:alpha val="38000"/>
               </a:srgbClr>
@@ -3604,7 +3995,7 @@
         </a:effectStyle>
         <a:effectStyle>
           <a:effectLst>
-            <a:outerShdw blurRad="40000" dist="23000" dir="5400000" rotWithShape="0">
+            <a:outerShdw blurRad="40000" dir="5400000" dist="23000" rotWithShape="0">
               <a:srgbClr val="000000">
                 <a:alpha val="35000"/>
               </a:srgbClr>
@@ -3613,7 +4004,7 @@
         </a:effectStyle>
         <a:effectStyle>
           <a:effectLst>
-            <a:outerShdw blurRad="40000" dist="23000" dir="5400000" rotWithShape="0">
+            <a:outerShdw blurRad="40000" dir="5400000" dist="23000" rotWithShape="0">
               <a:srgbClr val="000000">
                 <a:alpha val="35000"/>
               </a:srgbClr>
@@ -3623,12 +4014,12 @@
             <a:camera prst="orthographicFront">
               <a:rot lat="0" lon="0" rev="0"/>
             </a:camera>
-            <a:lightRig rig="threePt" dir="t">
+            <a:lightRig dir="t" rig="threePt">
               <a:rot lat="0" lon="0" rev="1200000"/>
             </a:lightRig>
           </a:scene3d>
           <a:sp3d>
-            <a:bevelT w="63500" h="25400"/>
+            <a:bevelT w="63500" h="25400" prst="circle"/>
           </a:sp3d>
         </a:effectStyle>
       </a:effectStyleLst>
@@ -3658,9 +4049,8 @@
               </a:schemeClr>
             </a:gs>
           </a:gsLst>
-          <a:path path="circle">
-            <a:fillToRect l="50000" t="-80000" r="50000" b="180000"/>
-          </a:path>
+          <a:path path="circle"/>
+          <a:tileRect/>
         </a:gradFill>
         <a:gradFill rotWithShape="1">
           <a:gsLst>
@@ -3680,14 +4070,11 @@
           <a:path path="circle">
             <a:fillToRect l="50000" t="50000" r="50000" b="50000"/>
           </a:path>
+          <a:tileRect/>
         </a:gradFill>
       </a:bgFillStyleLst>
     </a:fmtScheme>
   </a:themeElements>
-  <a:extLst>
-    <a:ext uri="{05A4C25C-085E-4340-85A3-A5531E510DB2}">
-      <thm15:themeFamily xmlns:thm15="http://schemas.microsoft.com/office/thememl/2012/main" name="Office Theme" id="{62F939B6-93AF-4DB8-9C6B-D6C7DFDC589F}" vid="{4A3C46E8-61CC-4603-A589-7422A47A8E4A}"/>
-    </a:ext>
-  </a:extLst>
+  <a:objectDefaults/>
 </a:theme>
 </file>
</xml_diff>

<commit_message>
spire changes for document table generation
</commit_message>
<xml_diff>
--- a/Templates/UpdateExistingTable6.pptx
+++ b/Templates/UpdateExistingTable6.pptx
@@ -7,11 +7,19 @@
   </p:sldMasterIdLst>
   <p:sldIdLst>
     <p:sldId r:id="rId2" id="256"/>
+    <p:sldId r:id="rId7" id="257"/>
+    <p:sldId r:id="rId8" id="258"/>
+    <p:sldId r:id="rId9" id="259"/>
+    <p:sldId r:id="rId10" id="260"/>
+    <p:sldId r:id="rId11" id="261"/>
+    <p:sldId r:id="rId12" id="262"/>
+    <p:sldId r:id="rId13" id="263"/>
+    <p:sldId r:id="rId14" id="264"/>
   </p:sldIdLst>
   <p:sldSz cx="9144000" cy="6858000" type="screen4x3"/>
   <p:notesSz cx="6858000" cy="9144000"/>
   <p:custDataLst>
-    <p:tags r:id="rId7"/>
+    <p:tags r:id="rId15"/>
   </p:custDataLst>
   <p:defaultTextStyle>
     <a:defPPr>
@@ -3007,7 +3015,7 @@
         </p:nvGraphicFramePr>
         <p:xfrm>
           <a:off x="1079500" y="1016000"/>
-          <a:ext cx="6985000" cy="4754880"/>
+          <a:ext cx="2540000" cy="1463040"/>
         </p:xfrm>
         <a:graphic>
           <a:graphicData uri="http://schemas.openxmlformats.org/drawingml/2006/table">
@@ -3018,44 +3026,8 @@
               <a:tblGrid>
                 <a:gridCol w="1270000"/>
                 <a:gridCol w="1270000"/>
-                <a:gridCol w="1905000"/>
-                <a:gridCol w="1270000"/>
-                <a:gridCol w="1270000"/>
               </a:tblGrid>
               <a:tr h="190500">
-                <a:tc>
-                  <a:txBody>
-                    <a:bodyPr anchorCtr="0"/>
-                    <a:lstStyle/>
-                    <a:p>
-                      <a:pPr algn="l"/>
-                      <a:endParaRPr/>
-                    </a:p>
-                  </a:txBody>
-                  <a:tcPr/>
-                </a:tc>
-                <a:tc>
-                  <a:txBody>
-                    <a:bodyPr anchorCtr="0"/>
-                    <a:lstStyle/>
-                    <a:p>
-                      <a:pPr algn="l"/>
-                      <a:endParaRPr/>
-                    </a:p>
-                  </a:txBody>
-                  <a:tcPr/>
-                </a:tc>
-                <a:tc>
-                  <a:txBody>
-                    <a:bodyPr anchorCtr="0"/>
-                    <a:lstStyle/>
-                    <a:p>
-                      <a:pPr algn="l"/>
-                      <a:endParaRPr/>
-                    </a:p>
-                  </a:txBody>
-                  <a:tcPr/>
-                </a:tc>
                 <a:tc>
                   <a:txBody>
                     <a:bodyPr anchorCtr="0"/>
@@ -3102,17 +3074,8 @@
                   </a:txBody>
                   <a:tcPr/>
                 </a:tc>
-                <a:tc>
-                  <a:txBody>
-                    <a:bodyPr anchorCtr="0"/>
-                    <a:lstStyle/>
-                    <a:p>
-                      <a:pPr algn="l"/>
-                      <a:endParaRPr/>
-                    </a:p>
-                  </a:txBody>
-                  <a:tcPr/>
-                </a:tc>
+              </a:tr>
+              <a:tr h="190500">
                 <a:tc>
                   <a:txBody>
                     <a:bodyPr anchorCtr="0"/>
@@ -3159,614 +3122,275 @@
                   </a:txBody>
                   <a:tcPr/>
                 </a:tc>
-                <a:tc>
-                  <a:txBody>
-                    <a:bodyPr anchorCtr="0"/>
-                    <a:lstStyle/>
-                    <a:p>
-                      <a:pPr algn="l"/>
-                      <a:endParaRPr/>
-                    </a:p>
-                  </a:txBody>
-                  <a:tcPr/>
-                </a:tc>
-                <a:tc>
-                  <a:txBody>
-                    <a:bodyPr anchorCtr="0"/>
-                    <a:lstStyle/>
-                    <a:p>
-                      <a:pPr algn="l"/>
-                      <a:endParaRPr/>
-                    </a:p>
-                  </a:txBody>
-                  <a:tcPr/>
-                </a:tc>
-                <a:tc>
-                  <a:txBody>
-                    <a:bodyPr anchorCtr="0"/>
-                    <a:lstStyle/>
-                    <a:p>
-                      <a:pPr algn="l"/>
-                      <a:endParaRPr/>
-                    </a:p>
-                  </a:txBody>
-                  <a:tcPr/>
-                </a:tc>
-              </a:tr>
-              <a:tr h="190500">
-                <a:tc>
-                  <a:txBody>
-                    <a:bodyPr anchorCtr="0"/>
-                    <a:lstStyle/>
-                    <a:p>
-                      <a:pPr algn="l"/>
-                      <a:endParaRPr/>
-                    </a:p>
-                  </a:txBody>
-                  <a:tcPr/>
-                </a:tc>
-                <a:tc>
-                  <a:txBody>
-                    <a:bodyPr anchorCtr="0"/>
-                    <a:lstStyle/>
-                    <a:p>
-                      <a:pPr algn="l"/>
-                      <a:endParaRPr/>
-                    </a:p>
-                  </a:txBody>
-                  <a:tcPr/>
-                </a:tc>
-                <a:tc>
-                  <a:txBody>
-                    <a:bodyPr anchorCtr="0"/>
-                    <a:lstStyle/>
-                    <a:p>
-                      <a:pPr algn="l"/>
-                      <a:endParaRPr/>
-                    </a:p>
-                  </a:txBody>
-                  <a:tcPr/>
-                </a:tc>
-                <a:tc>
-                  <a:txBody>
-                    <a:bodyPr anchorCtr="0"/>
-                    <a:lstStyle/>
-                    <a:p>
-                      <a:pPr algn="l"/>
-                      <a:endParaRPr/>
-                    </a:p>
-                  </a:txBody>
-                  <a:tcPr/>
-                </a:tc>
-                <a:tc>
-                  <a:txBody>
-                    <a:bodyPr anchorCtr="0"/>
-                    <a:lstStyle/>
-                    <a:p>
-                      <a:pPr algn="l"/>
-                      <a:endParaRPr/>
-                    </a:p>
-                  </a:txBody>
-                  <a:tcPr/>
-                </a:tc>
-              </a:tr>
-              <a:tr h="190500">
-                <a:tc>
-                  <a:txBody>
-                    <a:bodyPr anchorCtr="0"/>
-                    <a:lstStyle/>
-                    <a:p>
-                      <a:pPr algn="l"/>
-                      <a:endParaRPr/>
-                    </a:p>
-                  </a:txBody>
-                  <a:tcPr/>
-                </a:tc>
-                <a:tc>
-                  <a:txBody>
-                    <a:bodyPr anchorCtr="0"/>
-                    <a:lstStyle/>
-                    <a:p>
-                      <a:pPr algn="l"/>
-                      <a:endParaRPr/>
-                    </a:p>
-                  </a:txBody>
-                  <a:tcPr/>
-                </a:tc>
-                <a:tc>
-                  <a:txBody>
-                    <a:bodyPr anchorCtr="0"/>
-                    <a:lstStyle/>
-                    <a:p>
-                      <a:pPr algn="l"/>
-                      <a:endParaRPr/>
-                    </a:p>
-                  </a:txBody>
-                  <a:tcPr/>
-                </a:tc>
-                <a:tc>
-                  <a:txBody>
-                    <a:bodyPr anchorCtr="0"/>
-                    <a:lstStyle/>
-                    <a:p>
-                      <a:pPr algn="l"/>
-                      <a:endParaRPr/>
-                    </a:p>
-                  </a:txBody>
-                  <a:tcPr/>
-                </a:tc>
-                <a:tc>
-                  <a:txBody>
-                    <a:bodyPr anchorCtr="0"/>
-                    <a:lstStyle/>
-                    <a:p>
-                      <a:pPr algn="l"/>
-                      <a:endParaRPr/>
-                    </a:p>
-                  </a:txBody>
-                  <a:tcPr/>
-                </a:tc>
-              </a:tr>
-              <a:tr h="190500">
-                <a:tc>
-                  <a:txBody>
-                    <a:bodyPr anchorCtr="0"/>
-                    <a:lstStyle/>
-                    <a:p>
-                      <a:pPr algn="l"/>
-                      <a:endParaRPr/>
-                    </a:p>
-                  </a:txBody>
-                  <a:tcPr/>
-                </a:tc>
-                <a:tc>
-                  <a:txBody>
-                    <a:bodyPr anchorCtr="0"/>
-                    <a:lstStyle/>
-                    <a:p>
-                      <a:pPr algn="l"/>
-                      <a:endParaRPr/>
-                    </a:p>
-                  </a:txBody>
-                  <a:tcPr/>
-                </a:tc>
-                <a:tc>
-                  <a:txBody>
-                    <a:bodyPr anchorCtr="0"/>
-                    <a:lstStyle/>
-                    <a:p>
-                      <a:pPr algn="l"/>
-                      <a:endParaRPr/>
-                    </a:p>
-                  </a:txBody>
-                  <a:tcPr/>
-                </a:tc>
-                <a:tc>
-                  <a:txBody>
-                    <a:bodyPr anchorCtr="0"/>
-                    <a:lstStyle/>
-                    <a:p>
-                      <a:pPr algn="l"/>
-                      <a:endParaRPr/>
-                    </a:p>
-                  </a:txBody>
-                  <a:tcPr/>
-                </a:tc>
-                <a:tc>
-                  <a:txBody>
-                    <a:bodyPr anchorCtr="0"/>
-                    <a:lstStyle/>
-                    <a:p>
-                      <a:pPr algn="l"/>
-                      <a:endParaRPr/>
-                    </a:p>
-                  </a:txBody>
-                  <a:tcPr/>
-                </a:tc>
-              </a:tr>
-              <a:tr h="190500">
-                <a:tc>
-                  <a:txBody>
-                    <a:bodyPr anchorCtr="0"/>
-                    <a:lstStyle/>
-                    <a:p>
-                      <a:pPr algn="l"/>
-                      <a:endParaRPr/>
-                    </a:p>
-                  </a:txBody>
-                  <a:tcPr/>
-                </a:tc>
-                <a:tc>
-                  <a:txBody>
-                    <a:bodyPr anchorCtr="0"/>
-                    <a:lstStyle/>
-                    <a:p>
-                      <a:pPr algn="l"/>
-                      <a:endParaRPr/>
-                    </a:p>
-                  </a:txBody>
-                  <a:tcPr/>
-                </a:tc>
-                <a:tc>
-                  <a:txBody>
-                    <a:bodyPr anchorCtr="0"/>
-                    <a:lstStyle/>
-                    <a:p>
-                      <a:pPr algn="l"/>
-                      <a:endParaRPr/>
-                    </a:p>
-                  </a:txBody>
-                  <a:tcPr/>
-                </a:tc>
-                <a:tc>
-                  <a:txBody>
-                    <a:bodyPr anchorCtr="0"/>
-                    <a:lstStyle/>
-                    <a:p>
-                      <a:pPr algn="l"/>
-                      <a:endParaRPr/>
-                    </a:p>
-                  </a:txBody>
-                  <a:tcPr/>
-                </a:tc>
-                <a:tc>
-                  <a:txBody>
-                    <a:bodyPr anchorCtr="0"/>
-                    <a:lstStyle/>
-                    <a:p>
-                      <a:pPr algn="l"/>
-                      <a:endParaRPr/>
-                    </a:p>
-                  </a:txBody>
-                  <a:tcPr/>
-                </a:tc>
-              </a:tr>
-              <a:tr h="190500">
-                <a:tc>
-                  <a:txBody>
-                    <a:bodyPr anchorCtr="0"/>
-                    <a:lstStyle/>
-                    <a:p>
-                      <a:pPr algn="l"/>
-                      <a:endParaRPr/>
-                    </a:p>
-                  </a:txBody>
-                  <a:tcPr/>
-                </a:tc>
-                <a:tc>
-                  <a:txBody>
-                    <a:bodyPr anchorCtr="0"/>
-                    <a:lstStyle/>
-                    <a:p>
-                      <a:pPr algn="l"/>
-                      <a:endParaRPr/>
-                    </a:p>
-                  </a:txBody>
-                  <a:tcPr/>
-                </a:tc>
-                <a:tc>
-                  <a:txBody>
-                    <a:bodyPr anchorCtr="0"/>
-                    <a:lstStyle/>
-                    <a:p>
-                      <a:pPr algn="l"/>
-                      <a:endParaRPr/>
-                    </a:p>
-                  </a:txBody>
-                  <a:tcPr/>
-                </a:tc>
-                <a:tc>
-                  <a:txBody>
-                    <a:bodyPr anchorCtr="0"/>
-                    <a:lstStyle/>
-                    <a:p>
-                      <a:pPr algn="l"/>
-                      <a:endParaRPr/>
-                    </a:p>
-                  </a:txBody>
-                  <a:tcPr/>
-                </a:tc>
-                <a:tc>
-                  <a:txBody>
-                    <a:bodyPr anchorCtr="0"/>
-                    <a:lstStyle/>
-                    <a:p>
-                      <a:pPr algn="l"/>
-                      <a:endParaRPr/>
-                    </a:p>
-                  </a:txBody>
-                  <a:tcPr/>
-                </a:tc>
-              </a:tr>
-              <a:tr h="190500">
-                <a:tc>
-                  <a:txBody>
-                    <a:bodyPr anchorCtr="0"/>
-                    <a:lstStyle/>
-                    <a:p>
-                      <a:pPr algn="l"/>
-                      <a:endParaRPr/>
-                    </a:p>
-                  </a:txBody>
-                  <a:tcPr/>
-                </a:tc>
-                <a:tc>
-                  <a:txBody>
-                    <a:bodyPr anchorCtr="0"/>
-                    <a:lstStyle/>
-                    <a:p>
-                      <a:pPr algn="l"/>
-                      <a:endParaRPr/>
-                    </a:p>
-                  </a:txBody>
-                  <a:tcPr/>
-                </a:tc>
-                <a:tc>
-                  <a:txBody>
-                    <a:bodyPr anchorCtr="0"/>
-                    <a:lstStyle/>
-                    <a:p>
-                      <a:pPr algn="l"/>
-                      <a:endParaRPr/>
-                    </a:p>
-                  </a:txBody>
-                  <a:tcPr/>
-                </a:tc>
-                <a:tc>
-                  <a:txBody>
-                    <a:bodyPr anchorCtr="0"/>
-                    <a:lstStyle/>
-                    <a:p>
-                      <a:pPr algn="l"/>
-                      <a:endParaRPr/>
-                    </a:p>
-                  </a:txBody>
-                  <a:tcPr/>
-                </a:tc>
-                <a:tc>
-                  <a:txBody>
-                    <a:bodyPr anchorCtr="0"/>
-                    <a:lstStyle/>
-                    <a:p>
-                      <a:pPr algn="l"/>
-                      <a:endParaRPr/>
-                    </a:p>
-                  </a:txBody>
-                  <a:tcPr/>
-                </a:tc>
-              </a:tr>
-              <a:tr h="190500">
-                <a:tc>
-                  <a:txBody>
-                    <a:bodyPr anchorCtr="0"/>
-                    <a:lstStyle/>
-                    <a:p>
-                      <a:pPr algn="l"/>
-                      <a:endParaRPr/>
-                    </a:p>
-                  </a:txBody>
-                  <a:tcPr/>
-                </a:tc>
-                <a:tc>
-                  <a:txBody>
-                    <a:bodyPr anchorCtr="0"/>
-                    <a:lstStyle/>
-                    <a:p>
-                      <a:pPr algn="l"/>
-                      <a:endParaRPr/>
-                    </a:p>
-                  </a:txBody>
-                  <a:tcPr/>
-                </a:tc>
-                <a:tc>
-                  <a:txBody>
-                    <a:bodyPr anchorCtr="0"/>
-                    <a:lstStyle/>
-                    <a:p>
-                      <a:pPr algn="l"/>
-                      <a:endParaRPr/>
-                    </a:p>
-                  </a:txBody>
-                  <a:tcPr/>
-                </a:tc>
-                <a:tc>
-                  <a:txBody>
-                    <a:bodyPr anchorCtr="0"/>
-                    <a:lstStyle/>
-                    <a:p>
-                      <a:pPr algn="l"/>
-                      <a:endParaRPr/>
-                    </a:p>
-                  </a:txBody>
-                  <a:tcPr/>
-                </a:tc>
-                <a:tc>
-                  <a:txBody>
-                    <a:bodyPr anchorCtr="0"/>
-                    <a:lstStyle/>
-                    <a:p>
-                      <a:pPr algn="l"/>
-                      <a:endParaRPr/>
-                    </a:p>
-                  </a:txBody>
-                  <a:tcPr/>
-                </a:tc>
-              </a:tr>
-              <a:tr h="190500">
-                <a:tc>
-                  <a:txBody>
-                    <a:bodyPr anchorCtr="0"/>
-                    <a:lstStyle/>
-                    <a:p>
-                      <a:pPr algn="l"/>
-                      <a:endParaRPr/>
-                    </a:p>
-                  </a:txBody>
-                  <a:tcPr/>
-                </a:tc>
-                <a:tc>
-                  <a:txBody>
-                    <a:bodyPr anchorCtr="0"/>
-                    <a:lstStyle/>
-                    <a:p>
-                      <a:pPr algn="l"/>
-                      <a:endParaRPr/>
-                    </a:p>
-                  </a:txBody>
-                  <a:tcPr/>
-                </a:tc>
-                <a:tc>
-                  <a:txBody>
-                    <a:bodyPr anchorCtr="0"/>
-                    <a:lstStyle/>
-                    <a:p>
-                      <a:pPr algn="l"/>
-                      <a:endParaRPr/>
-                    </a:p>
-                  </a:txBody>
-                  <a:tcPr/>
-                </a:tc>
-                <a:tc>
-                  <a:txBody>
-                    <a:bodyPr anchorCtr="0"/>
-                    <a:lstStyle/>
-                    <a:p>
-                      <a:pPr algn="l"/>
-                      <a:endParaRPr/>
-                    </a:p>
-                  </a:txBody>
-                  <a:tcPr/>
-                </a:tc>
-                <a:tc>
-                  <a:txBody>
-                    <a:bodyPr anchorCtr="0"/>
-                    <a:lstStyle/>
-                    <a:p>
-                      <a:pPr algn="l"/>
-                      <a:endParaRPr/>
-                    </a:p>
-                  </a:txBody>
-                  <a:tcPr/>
-                </a:tc>
-              </a:tr>
-              <a:tr h="190500">
-                <a:tc>
-                  <a:txBody>
-                    <a:bodyPr anchorCtr="0"/>
-                    <a:lstStyle/>
-                    <a:p>
-                      <a:pPr algn="l"/>
-                      <a:endParaRPr/>
-                    </a:p>
-                  </a:txBody>
-                  <a:tcPr/>
-                </a:tc>
-                <a:tc>
-                  <a:txBody>
-                    <a:bodyPr anchorCtr="0"/>
-                    <a:lstStyle/>
-                    <a:p>
-                      <a:pPr algn="l"/>
-                      <a:endParaRPr/>
-                    </a:p>
-                  </a:txBody>
-                  <a:tcPr/>
-                </a:tc>
-                <a:tc>
-                  <a:txBody>
-                    <a:bodyPr anchorCtr="0"/>
-                    <a:lstStyle/>
-                    <a:p>
-                      <a:pPr algn="l"/>
-                      <a:endParaRPr/>
-                    </a:p>
-                  </a:txBody>
-                  <a:tcPr/>
-                </a:tc>
-                <a:tc>
-                  <a:txBody>
-                    <a:bodyPr anchorCtr="0"/>
-                    <a:lstStyle/>
-                    <a:p>
-                      <a:pPr algn="l"/>
-                      <a:endParaRPr/>
-                    </a:p>
-                  </a:txBody>
-                  <a:tcPr/>
-                </a:tc>
-                <a:tc>
-                  <a:txBody>
-                    <a:bodyPr anchorCtr="0"/>
-                    <a:lstStyle/>
-                    <a:p>
-                      <a:pPr algn="l"/>
-                      <a:endParaRPr/>
-                    </a:p>
-                  </a:txBody>
-                  <a:tcPr/>
-                </a:tc>
-              </a:tr>
-              <a:tr h="190500">
-                <a:tc>
-                  <a:txBody>
-                    <a:bodyPr anchorCtr="0"/>
-                    <a:lstStyle/>
-                    <a:p>
-                      <a:pPr algn="l"/>
-                      <a:endParaRPr/>
-                    </a:p>
-                  </a:txBody>
-                  <a:tcPr/>
-                </a:tc>
-                <a:tc>
-                  <a:txBody>
-                    <a:bodyPr anchorCtr="0"/>
-                    <a:lstStyle/>
-                    <a:p>
-                      <a:pPr algn="l"/>
-                      <a:endParaRPr/>
-                    </a:p>
-                  </a:txBody>
-                  <a:tcPr/>
-                </a:tc>
-                <a:tc>
-                  <a:txBody>
-                    <a:bodyPr anchorCtr="0"/>
-                    <a:lstStyle/>
-                    <a:p>
-                      <a:pPr algn="l"/>
-                      <a:endParaRPr/>
-                    </a:p>
-                  </a:txBody>
-                  <a:tcPr/>
-                </a:tc>
-                <a:tc>
-                  <a:txBody>
-                    <a:bodyPr anchorCtr="0"/>
-                    <a:lstStyle/>
-                    <a:p>
-                      <a:pPr algn="l"/>
-                      <a:endParaRPr/>
-                    </a:p>
-                  </a:txBody>
-                  <a:tcPr/>
-                </a:tc>
-                <a:tc>
-                  <a:txBody>
-                    <a:bodyPr anchorCtr="0"/>
-                    <a:lstStyle/>
-                    <a:p>
-                      <a:pPr algn="l"/>
-                      <a:endParaRPr/>
-                    </a:p>
-                  </a:txBody>
-                  <a:tcPr/>
-                </a:tc>
               </a:tr>
             </a:tbl>
           </a:graphicData>
         </a:graphic>
       </p:graphicFrame>
+    </p:spTree>
+  </p:cSld>
+  <p:clrMapOvr>
+    <a:masterClrMapping/>
+  </p:clrMapOvr>
+  <p:transition spd="fast"/>
+  <p:timing>
+    <p:tnLst>
+      <p:par>
+        <p:cTn id="1" restart="never" nodeType="tmRoot"/>
+      </p:par>
+    </p:tnLst>
+  </p:timing>
+</p:sld>
+</file>
+
+<file path=ppt/slides/slide2.xml><?xml version="1.0" encoding="utf-8"?>
+<p:sld xmlns:a="http://schemas.openxmlformats.org/drawingml/2006/main" xmlns:r="http://schemas.openxmlformats.org/officeDocument/2006/relationships" xmlns:p="http://schemas.openxmlformats.org/presentationml/2006/main">
+  <p:cSld name="">
+    <p:spTree>
+      <p:nvGrpSpPr>
+        <p:cNvPr id="1" name=""/>
+        <p:cNvGrpSpPr/>
+        <p:nvPr/>
+      </p:nvGrpSpPr>
+      <p:grpSpPr>
+        <a:xfrm>
+          <a:off x="0" y="0"/>
+          <a:ext cx="0" cy="0"/>
+          <a:chOff x="0" y="0"/>
+          <a:chExt cx="0" cy="0"/>
+        </a:xfrm>
+      </p:grpSpPr>
+    </p:spTree>
+  </p:cSld>
+  <p:clrMapOvr>
+    <a:masterClrMapping/>
+  </p:clrMapOvr>
+  <p:transition spd="fast"/>
+  <p:timing>
+    <p:tnLst>
+      <p:par>
+        <p:cTn id="1" restart="never" nodeType="tmRoot"/>
+      </p:par>
+    </p:tnLst>
+  </p:timing>
+</p:sld>
+</file>
+
+<file path=ppt/slides/slide3.xml><?xml version="1.0" encoding="utf-8"?>
+<p:sld xmlns:a="http://schemas.openxmlformats.org/drawingml/2006/main" xmlns:r="http://schemas.openxmlformats.org/officeDocument/2006/relationships" xmlns:p="http://schemas.openxmlformats.org/presentationml/2006/main">
+  <p:cSld name="">
+    <p:spTree>
+      <p:nvGrpSpPr>
+        <p:cNvPr id="1" name=""/>
+        <p:cNvGrpSpPr/>
+        <p:nvPr/>
+      </p:nvGrpSpPr>
+      <p:grpSpPr>
+        <a:xfrm>
+          <a:off x="0" y="0"/>
+          <a:ext cx="0" cy="0"/>
+          <a:chOff x="0" y="0"/>
+          <a:chExt cx="0" cy="0"/>
+        </a:xfrm>
+      </p:grpSpPr>
+    </p:spTree>
+  </p:cSld>
+  <p:clrMapOvr>
+    <a:masterClrMapping/>
+  </p:clrMapOvr>
+  <p:transition spd="fast"/>
+  <p:timing>
+    <p:tnLst>
+      <p:par>
+        <p:cTn id="1" restart="never" nodeType="tmRoot"/>
+      </p:par>
+    </p:tnLst>
+  </p:timing>
+</p:sld>
+</file>
+
+<file path=ppt/slides/slide4.xml><?xml version="1.0" encoding="utf-8"?>
+<p:sld xmlns:a="http://schemas.openxmlformats.org/drawingml/2006/main" xmlns:r="http://schemas.openxmlformats.org/officeDocument/2006/relationships" xmlns:p="http://schemas.openxmlformats.org/presentationml/2006/main">
+  <p:cSld name="">
+    <p:spTree>
+      <p:nvGrpSpPr>
+        <p:cNvPr id="1" name=""/>
+        <p:cNvGrpSpPr/>
+        <p:nvPr/>
+      </p:nvGrpSpPr>
+      <p:grpSpPr>
+        <a:xfrm>
+          <a:off x="0" y="0"/>
+          <a:ext cx="0" cy="0"/>
+          <a:chOff x="0" y="0"/>
+          <a:chExt cx="0" cy="0"/>
+        </a:xfrm>
+      </p:grpSpPr>
+    </p:spTree>
+  </p:cSld>
+  <p:clrMapOvr>
+    <a:masterClrMapping/>
+  </p:clrMapOvr>
+  <p:transition spd="fast"/>
+  <p:timing>
+    <p:tnLst>
+      <p:par>
+        <p:cTn id="1" restart="never" nodeType="tmRoot"/>
+      </p:par>
+    </p:tnLst>
+  </p:timing>
+</p:sld>
+</file>
+
+<file path=ppt/slides/slide5.xml><?xml version="1.0" encoding="utf-8"?>
+<p:sld xmlns:a="http://schemas.openxmlformats.org/drawingml/2006/main" xmlns:r="http://schemas.openxmlformats.org/officeDocument/2006/relationships" xmlns:p="http://schemas.openxmlformats.org/presentationml/2006/main">
+  <p:cSld name="">
+    <p:spTree>
+      <p:nvGrpSpPr>
+        <p:cNvPr id="1" name=""/>
+        <p:cNvGrpSpPr/>
+        <p:nvPr/>
+      </p:nvGrpSpPr>
+      <p:grpSpPr>
+        <a:xfrm>
+          <a:off x="0" y="0"/>
+          <a:ext cx="0" cy="0"/>
+          <a:chOff x="0" y="0"/>
+          <a:chExt cx="0" cy="0"/>
+        </a:xfrm>
+      </p:grpSpPr>
+    </p:spTree>
+  </p:cSld>
+  <p:clrMapOvr>
+    <a:masterClrMapping/>
+  </p:clrMapOvr>
+  <p:transition spd="fast"/>
+  <p:timing>
+    <p:tnLst>
+      <p:par>
+        <p:cTn id="1" restart="never" nodeType="tmRoot"/>
+      </p:par>
+    </p:tnLst>
+  </p:timing>
+</p:sld>
+</file>
+
+<file path=ppt/slides/slide6.xml><?xml version="1.0" encoding="utf-8"?>
+<p:sld xmlns:a="http://schemas.openxmlformats.org/drawingml/2006/main" xmlns:r="http://schemas.openxmlformats.org/officeDocument/2006/relationships" xmlns:p="http://schemas.openxmlformats.org/presentationml/2006/main">
+  <p:cSld name="">
+    <p:spTree>
+      <p:nvGrpSpPr>
+        <p:cNvPr id="1" name=""/>
+        <p:cNvGrpSpPr/>
+        <p:nvPr/>
+      </p:nvGrpSpPr>
+      <p:grpSpPr>
+        <a:xfrm>
+          <a:off x="0" y="0"/>
+          <a:ext cx="0" cy="0"/>
+          <a:chOff x="0" y="0"/>
+          <a:chExt cx="0" cy="0"/>
+        </a:xfrm>
+      </p:grpSpPr>
+    </p:spTree>
+  </p:cSld>
+  <p:clrMapOvr>
+    <a:masterClrMapping/>
+  </p:clrMapOvr>
+  <p:transition spd="fast"/>
+  <p:timing>
+    <p:tnLst>
+      <p:par>
+        <p:cTn id="1" restart="never" nodeType="tmRoot"/>
+      </p:par>
+    </p:tnLst>
+  </p:timing>
+</p:sld>
+</file>
+
+<file path=ppt/slides/slide7.xml><?xml version="1.0" encoding="utf-8"?>
+<p:sld xmlns:a="http://schemas.openxmlformats.org/drawingml/2006/main" xmlns:r="http://schemas.openxmlformats.org/officeDocument/2006/relationships" xmlns:p="http://schemas.openxmlformats.org/presentationml/2006/main">
+  <p:cSld name="">
+    <p:spTree>
+      <p:nvGrpSpPr>
+        <p:cNvPr id="1" name=""/>
+        <p:cNvGrpSpPr/>
+        <p:nvPr/>
+      </p:nvGrpSpPr>
+      <p:grpSpPr>
+        <a:xfrm>
+          <a:off x="0" y="0"/>
+          <a:ext cx="0" cy="0"/>
+          <a:chOff x="0" y="0"/>
+          <a:chExt cx="0" cy="0"/>
+        </a:xfrm>
+      </p:grpSpPr>
+    </p:spTree>
+  </p:cSld>
+  <p:clrMapOvr>
+    <a:masterClrMapping/>
+  </p:clrMapOvr>
+  <p:transition spd="fast"/>
+  <p:timing>
+    <p:tnLst>
+      <p:par>
+        <p:cTn id="1" restart="never" nodeType="tmRoot"/>
+      </p:par>
+    </p:tnLst>
+  </p:timing>
+</p:sld>
+</file>
+
+<file path=ppt/slides/slide8.xml><?xml version="1.0" encoding="utf-8"?>
+<p:sld xmlns:a="http://schemas.openxmlformats.org/drawingml/2006/main" xmlns:r="http://schemas.openxmlformats.org/officeDocument/2006/relationships" xmlns:p="http://schemas.openxmlformats.org/presentationml/2006/main">
+  <p:cSld name="">
+    <p:spTree>
+      <p:nvGrpSpPr>
+        <p:cNvPr id="1" name=""/>
+        <p:cNvGrpSpPr/>
+        <p:nvPr/>
+      </p:nvGrpSpPr>
+      <p:grpSpPr>
+        <a:xfrm>
+          <a:off x="0" y="0"/>
+          <a:ext cx="0" cy="0"/>
+          <a:chOff x="0" y="0"/>
+          <a:chExt cx="0" cy="0"/>
+        </a:xfrm>
+      </p:grpSpPr>
+    </p:spTree>
+  </p:cSld>
+  <p:clrMapOvr>
+    <a:masterClrMapping/>
+  </p:clrMapOvr>
+  <p:transition spd="fast"/>
+  <p:timing>
+    <p:tnLst>
+      <p:par>
+        <p:cTn id="1" restart="never" nodeType="tmRoot"/>
+      </p:par>
+    </p:tnLst>
+  </p:timing>
+</p:sld>
+</file>
+
+<file path=ppt/slides/slide9.xml><?xml version="1.0" encoding="utf-8"?>
+<p:sld xmlns:a="http://schemas.openxmlformats.org/drawingml/2006/main" xmlns:r="http://schemas.openxmlformats.org/officeDocument/2006/relationships" xmlns:p="http://schemas.openxmlformats.org/presentationml/2006/main">
+  <p:cSld name="">
+    <p:spTree>
+      <p:nvGrpSpPr>
+        <p:cNvPr id="1" name=""/>
+        <p:cNvGrpSpPr/>
+        <p:nvPr/>
+      </p:nvGrpSpPr>
+      <p:grpSpPr>
+        <a:xfrm>
+          <a:off x="0" y="0"/>
+          <a:ext cx="0" cy="0"/>
+          <a:chOff x="0" y="0"/>
+          <a:chExt cx="0" cy="0"/>
+        </a:xfrm>
+      </p:grpSpPr>
     </p:spTree>
   </p:cSld>
   <p:clrMapOvr>
@@ -3839,71 +3463,71 @@
         <a:latin typeface="Calibri"/>
         <a:ea typeface=""/>
         <a:cs typeface=""/>
+        <a:font script="Hans" typeface="宋体"/>
+        <a:font script="Thai" typeface="Angsana New"/>
+        <a:font script="Sinh" typeface="Iskoola Pota"/>
         <a:font script="Ethi" typeface="Nyala"/>
-        <a:font script="Thaa" typeface="MV Boli"/>
-        <a:font script="Laoo" typeface="DokChampa"/>
         <a:font script="Guru" typeface="Raavi"/>
-        <a:font script="Jpan" typeface="ＭＳ Ｐゴシック"/>
+        <a:font script="Cher" typeface="Plantagenet Cherokee"/>
         <a:font script="Hant" typeface="新細明體"/>
         <a:font script="Tibt" typeface="Microsoft Himalaya"/>
+        <a:font script="Mlym" typeface="Kartika"/>
+        <a:font script="Beng" typeface="Vrinda"/>
+        <a:font script="Taml" typeface="Latha"/>
+        <a:font script="Mong" typeface="Mongolian Baiti"/>
+        <a:font script="Orya" typeface="Kalinga"/>
+        <a:font script="Cans" typeface="Euphemia"/>
+        <a:font script="Khmr" typeface="MoolBoran"/>
+        <a:font script="Syrc" typeface="Estrangelo Edessa"/>
+        <a:font script="Hang" typeface="맑은 고딕"/>
+        <a:font script="Thaa" typeface="MV Boli"/>
+        <a:font script="Yiii" typeface="Microsoft Yi Baiti"/>
+        <a:font script="Deva" typeface="Mangal"/>
+        <a:font script="Viet" typeface="Times New Roman"/>
+        <a:font script="Hebr" typeface="Times New Roman"/>
         <a:font script="Telu" typeface="Gautami"/>
-        <a:font script="Hebr" typeface="Times New Roman"/>
-        <a:font script="Hang" typeface="맑은 고딕"/>
-        <a:font script="Sinh" typeface="Iskoola Pota"/>
-        <a:font script="Yiii" typeface="Microsoft Yi Baiti"/>
-        <a:font script="Khmr" typeface="MoolBoran"/>
-        <a:font script="Thai" typeface="Angsana New"/>
-        <a:font script="Viet" typeface="Times New Roman"/>
-        <a:font script="Mlym" typeface="Kartika"/>
-        <a:font script="Taml" typeface="Latha"/>
+        <a:font script="Gujr" typeface="Shruti"/>
+        <a:font script="Jpan" typeface="ＭＳ Ｐゴシック"/>
+        <a:font script="Geor" typeface="Sylfaen"/>
+        <a:font script="Laoo" typeface="DokChampa"/>
+        <a:font script="Arab" typeface="Times New Roman"/>
         <a:font script="Uigh" typeface="Microsoft Uighur"/>
         <a:font script="Knda" typeface="Tunga"/>
-        <a:font script="Gujr" typeface="Shruti"/>
-        <a:font script="Arab" typeface="Times New Roman"/>
-        <a:font script="Beng" typeface="Vrinda"/>
-        <a:font script="Hans" typeface="宋体"/>
-        <a:font script="Orya" typeface="Kalinga"/>
-        <a:font script="Cans" typeface="Euphemia"/>
-        <a:font script="Cher" typeface="Plantagenet Cherokee"/>
-        <a:font script="Mong" typeface="Mongolian Baiti"/>
-        <a:font script="Syrc" typeface="Estrangelo Edessa"/>
-        <a:font script="Geor" typeface="Sylfaen"/>
-        <a:font script="Deva" typeface="Mangal"/>
       </a:majorFont>
       <a:minorFont>
         <a:latin typeface="Calibri"/>
         <a:ea typeface=""/>
         <a:cs typeface=""/>
+        <a:font script="Hans" typeface="宋体"/>
+        <a:font script="Thai" typeface="Cordia New"/>
+        <a:font script="Sinh" typeface="Iskoola Pota"/>
         <a:font script="Ethi" typeface="Nyala"/>
-        <a:font script="Thaa" typeface="MV Boli"/>
-        <a:font script="Laoo" typeface="DokChampa"/>
         <a:font script="Guru" typeface="Raavi"/>
-        <a:font script="Jpan" typeface="ＭＳ Ｐゴシック"/>
+        <a:font script="Cher" typeface="Plantagenet Cherokee"/>
         <a:font script="Hant" typeface="新細明體"/>
         <a:font script="Tibt" typeface="Microsoft Himalaya"/>
+        <a:font script="Mlym" typeface="Kartika"/>
+        <a:font script="Beng" typeface="Vrinda"/>
+        <a:font script="Taml" typeface="Latha"/>
+        <a:font script="Mong" typeface="Mongolian Baiti"/>
+        <a:font script="Orya" typeface="Kalinga"/>
+        <a:font script="Cans" typeface="Euphemia"/>
+        <a:font script="Khmr" typeface="DaunPenh"/>
+        <a:font script="Syrc" typeface="Estrangelo Edessa"/>
+        <a:font script="Hang" typeface="맑은 고딕"/>
+        <a:font script="Thaa" typeface="MV Boli"/>
+        <a:font script="Yiii" typeface="Microsoft Yi Baiti"/>
+        <a:font script="Deva" typeface="Mangal"/>
+        <a:font script="Viet" typeface="Arial"/>
+        <a:font script="Hebr" typeface="Arial"/>
         <a:font script="Telu" typeface="Gautami"/>
-        <a:font script="Hebr" typeface="Arial"/>
-        <a:font script="Hang" typeface="맑은 고딕"/>
-        <a:font script="Sinh" typeface="Iskoola Pota"/>
-        <a:font script="Yiii" typeface="Microsoft Yi Baiti"/>
-        <a:font script="Khmr" typeface="DaunPenh"/>
-        <a:font script="Thai" typeface="Cordia New"/>
-        <a:font script="Viet" typeface="Arial"/>
-        <a:font script="Mlym" typeface="Kartika"/>
-        <a:font script="Taml" typeface="Latha"/>
+        <a:font script="Gujr" typeface="Shruti"/>
+        <a:font script="Jpan" typeface="ＭＳ Ｐゴシック"/>
+        <a:font script="Geor" typeface="Sylfaen"/>
+        <a:font script="Laoo" typeface="DokChampa"/>
+        <a:font script="Arab" typeface="Arial"/>
         <a:font script="Uigh" typeface="Microsoft Uighur"/>
         <a:font script="Knda" typeface="Tunga"/>
-        <a:font script="Gujr" typeface="Shruti"/>
-        <a:font script="Arab" typeface="Arial"/>
-        <a:font script="Beng" typeface="Vrinda"/>
-        <a:font script="Hans" typeface="宋体"/>
-        <a:font script="Orya" typeface="Kalinga"/>
-        <a:font script="Cans" typeface="Euphemia"/>
-        <a:font script="Cher" typeface="Plantagenet Cherokee"/>
-        <a:font script="Mong" typeface="Mongolian Baiti"/>
-        <a:font script="Syrc" typeface="Estrangelo Edessa"/>
-        <a:font script="Geor" typeface="Sylfaen"/>
-        <a:font script="Deva" typeface="Mangal"/>
       </a:minorFont>
     </a:fontScheme>
     <a:fmtScheme name="Office">

</xml_diff>